<commit_message>
- updated app hierarchy diagram
</commit_message>
<xml_diff>
--- a/docs/diagrams/source/app hierarchy.pptx
+++ b/docs/diagrams/source/app hierarchy.pptx
@@ -5,7 +5,7 @@
     <p:sldMasterId id="2147483648" r:id="rId1"/>
   </p:sldMasterIdLst>
   <p:sldIdLst>
-    <p:sldId id="256" r:id="rId2"/>
+    <p:sldId id="258" r:id="rId2"/>
   </p:sldIdLst>
   <p:sldSz cx="12192000" cy="6858000"/>
   <p:notesSz cx="6858000" cy="9144000"/>
@@ -259,7 +259,7 @@
           <a:p>
             <a:fld id="{9218C037-0CDA-4AFF-9401-E8C27D0BCF5A}" type="datetimeFigureOut">
               <a:rPr lang="en-US" smtClean="0"/>
-              <a:t>2/9/2021</a:t>
+              <a:t>4/25/2023</a:t>
             </a:fld>
             <a:endParaRPr lang="en-US"/>
           </a:p>
@@ -457,7 +457,7 @@
           <a:p>
             <a:fld id="{9218C037-0CDA-4AFF-9401-E8C27D0BCF5A}" type="datetimeFigureOut">
               <a:rPr lang="en-US" smtClean="0"/>
-              <a:t>2/9/2021</a:t>
+              <a:t>4/25/2023</a:t>
             </a:fld>
             <a:endParaRPr lang="en-US"/>
           </a:p>
@@ -665,7 +665,7 @@
           <a:p>
             <a:fld id="{9218C037-0CDA-4AFF-9401-E8C27D0BCF5A}" type="datetimeFigureOut">
               <a:rPr lang="en-US" smtClean="0"/>
-              <a:t>2/9/2021</a:t>
+              <a:t>4/25/2023</a:t>
             </a:fld>
             <a:endParaRPr lang="en-US"/>
           </a:p>
@@ -863,7 +863,7 @@
           <a:p>
             <a:fld id="{9218C037-0CDA-4AFF-9401-E8C27D0BCF5A}" type="datetimeFigureOut">
               <a:rPr lang="en-US" smtClean="0"/>
-              <a:t>2/9/2021</a:t>
+              <a:t>4/25/2023</a:t>
             </a:fld>
             <a:endParaRPr lang="en-US"/>
           </a:p>
@@ -1138,7 +1138,7 @@
           <a:p>
             <a:fld id="{9218C037-0CDA-4AFF-9401-E8C27D0BCF5A}" type="datetimeFigureOut">
               <a:rPr lang="en-US" smtClean="0"/>
-              <a:t>2/9/2021</a:t>
+              <a:t>4/25/2023</a:t>
             </a:fld>
             <a:endParaRPr lang="en-US"/>
           </a:p>
@@ -1403,7 +1403,7 @@
           <a:p>
             <a:fld id="{9218C037-0CDA-4AFF-9401-E8C27D0BCF5A}" type="datetimeFigureOut">
               <a:rPr lang="en-US" smtClean="0"/>
-              <a:t>2/9/2021</a:t>
+              <a:t>4/25/2023</a:t>
             </a:fld>
             <a:endParaRPr lang="en-US"/>
           </a:p>
@@ -1815,7 +1815,7 @@
           <a:p>
             <a:fld id="{9218C037-0CDA-4AFF-9401-E8C27D0BCF5A}" type="datetimeFigureOut">
               <a:rPr lang="en-US" smtClean="0"/>
-              <a:t>2/9/2021</a:t>
+              <a:t>4/25/2023</a:t>
             </a:fld>
             <a:endParaRPr lang="en-US"/>
           </a:p>
@@ -1956,7 +1956,7 @@
           <a:p>
             <a:fld id="{9218C037-0CDA-4AFF-9401-E8C27D0BCF5A}" type="datetimeFigureOut">
               <a:rPr lang="en-US" smtClean="0"/>
-              <a:t>2/9/2021</a:t>
+              <a:t>4/25/2023</a:t>
             </a:fld>
             <a:endParaRPr lang="en-US"/>
           </a:p>
@@ -2069,7 +2069,7 @@
           <a:p>
             <a:fld id="{9218C037-0CDA-4AFF-9401-E8C27D0BCF5A}" type="datetimeFigureOut">
               <a:rPr lang="en-US" smtClean="0"/>
-              <a:t>2/9/2021</a:t>
+              <a:t>4/25/2023</a:t>
             </a:fld>
             <a:endParaRPr lang="en-US"/>
           </a:p>
@@ -2380,7 +2380,7 @@
           <a:p>
             <a:fld id="{9218C037-0CDA-4AFF-9401-E8C27D0BCF5A}" type="datetimeFigureOut">
               <a:rPr lang="en-US" smtClean="0"/>
-              <a:t>2/9/2021</a:t>
+              <a:t>4/25/2023</a:t>
             </a:fld>
             <a:endParaRPr lang="en-US"/>
           </a:p>
@@ -2668,7 +2668,7 @@
           <a:p>
             <a:fld id="{9218C037-0CDA-4AFF-9401-E8C27D0BCF5A}" type="datetimeFigureOut">
               <a:rPr lang="en-US" smtClean="0"/>
-              <a:t>2/9/2021</a:t>
+              <a:t>4/25/2023</a:t>
             </a:fld>
             <a:endParaRPr lang="en-US"/>
           </a:p>
@@ -2909,7 +2909,7 @@
           <a:p>
             <a:fld id="{9218C037-0CDA-4AFF-9401-E8C27D0BCF5A}" type="datetimeFigureOut">
               <a:rPr lang="en-US" smtClean="0"/>
-              <a:t>2/9/2021</a:t>
+              <a:t>4/25/2023</a:t>
             </a:fld>
             <a:endParaRPr lang="en-US"/>
           </a:p>
@@ -3341,7 +3341,7 @@
         <p:spPr>
           <a:xfrm>
             <a:off x="394161" y="293219"/>
-            <a:ext cx="1201355" cy="461665"/>
+            <a:ext cx="2030877" cy="461665"/>
           </a:xfrm>
           <a:prstGeom prst="rect">
             <a:avLst/>
@@ -3356,17 +3356,17 @@
           <a:p>
             <a:r>
               <a:rPr lang="en-US" sz="2400" dirty="0"/>
-              <a:t>UI Flow:</a:t>
-            </a:r>
-          </a:p>
-        </p:txBody>
-      </p:sp>
-      <p:sp>
-        <p:nvSpPr>
-          <p:cNvPr id="4" name="TextBox 3">
-            <a:extLst>
-              <a:ext uri="{FF2B5EF4-FFF2-40B4-BE49-F238E27FC236}">
-                <a16:creationId xmlns:a16="http://schemas.microsoft.com/office/drawing/2014/main" id="{712D4233-AD5E-40F7-9BB0-7A49D1E0ABC7}"/>
+              <a:t>App Hierarchy:</a:t>
+            </a:r>
+          </a:p>
+        </p:txBody>
+      </p:sp>
+      <p:sp>
+        <p:nvSpPr>
+          <p:cNvPr id="19" name="TextBox 18">
+            <a:extLst>
+              <a:ext uri="{FF2B5EF4-FFF2-40B4-BE49-F238E27FC236}">
+                <a16:creationId xmlns:a16="http://schemas.microsoft.com/office/drawing/2014/main" id="{5AB0696E-555C-45CC-BDBB-F64197368427}"/>
               </a:ext>
             </a:extLst>
           </p:cNvPr>
@@ -3375,8 +3375,78 @@
         </p:nvSpPr>
         <p:spPr>
           <a:xfrm>
-            <a:off x="2955988" y="691421"/>
-            <a:ext cx="2433680" cy="1015663"/>
+            <a:off x="10701795" y="5816500"/>
+            <a:ext cx="1222771" cy="338554"/>
+          </a:xfrm>
+          <a:prstGeom prst="rect">
+            <a:avLst/>
+          </a:prstGeom>
+          <a:ln w="28575">
+            <a:solidFill>
+              <a:schemeClr val="accent6"/>
+            </a:solidFill>
+          </a:ln>
+        </p:spPr>
+        <p:style>
+          <a:lnRef idx="2">
+            <a:schemeClr val="dk1"/>
+          </a:lnRef>
+          <a:fillRef idx="1">
+            <a:schemeClr val="lt1"/>
+          </a:fillRef>
+          <a:effectRef idx="0">
+            <a:schemeClr val="dk1"/>
+          </a:effectRef>
+          <a:fontRef idx="minor">
+            <a:schemeClr val="dk1"/>
+          </a:fontRef>
+        </p:style>
+        <p:txBody>
+          <a:bodyPr wrap="none" rtlCol="0">
+            <a:spAutoFit/>
+          </a:bodyPr>
+          <a:lstStyle/>
+          <a:p>
+            <a:r>
+              <a:rPr lang="en-US" sz="1400" dirty="0">
+                <a:solidFill>
+                  <a:schemeClr val="accent6"/>
+                </a:solidFill>
+              </a:rPr>
+              <a:t>Entities</a:t>
+            </a:r>
+            <a:r>
+              <a:rPr lang="en-US" sz="1600" dirty="0">
+                <a:solidFill>
+                  <a:schemeClr val="accent6"/>
+                </a:solidFill>
+              </a:rPr>
+              <a:t> Team</a:t>
+            </a:r>
+            <a:endParaRPr lang="en-US" sz="1200" i="1" dirty="0">
+              <a:solidFill>
+                <a:schemeClr val="accent6"/>
+              </a:solidFill>
+            </a:endParaRPr>
+          </a:p>
+        </p:txBody>
+      </p:sp>
+      <p:sp>
+        <p:nvSpPr>
+          <p:cNvPr id="20" name="TextBox 19">
+            <a:extLst>
+              <a:ext uri="{FF2B5EF4-FFF2-40B4-BE49-F238E27FC236}">
+                <a16:creationId xmlns:a16="http://schemas.microsoft.com/office/drawing/2014/main" id="{159BE1B8-7D43-4C9A-8AFC-959923351088}"/>
+              </a:ext>
+            </a:extLst>
+          </p:cNvPr>
+          <p:cNvSpPr txBox="1"/>
+          <p:nvPr/>
+        </p:nvSpPr>
+        <p:spPr>
+          <a:xfrm>
+            <a:off x="10274627" y="6305079"/>
+            <a:ext cx="1649939" cy="338554"/>
           </a:xfrm>
           <a:prstGeom prst="rect">
             <a:avLst/>
@@ -3408,13 +3478,83 @@
           <a:lstStyle/>
           <a:p>
             <a:r>
+              <a:rPr lang="en-US" sz="1400" dirty="0">
+                <a:solidFill>
+                  <a:schemeClr val="accent1"/>
+                </a:solidFill>
+              </a:rPr>
+              <a:t>Relationships</a:t>
+            </a:r>
+            <a:r>
+              <a:rPr lang="en-US" sz="1600" dirty="0">
+                <a:solidFill>
+                  <a:schemeClr val="accent1"/>
+                </a:solidFill>
+              </a:rPr>
+              <a:t> Team</a:t>
+            </a:r>
+          </a:p>
+        </p:txBody>
+      </p:sp>
+      <p:sp>
+        <p:nvSpPr>
+          <p:cNvPr id="11" name="TextBox 10">
+            <a:extLst>
+              <a:ext uri="{FF2B5EF4-FFF2-40B4-BE49-F238E27FC236}">
+                <a16:creationId xmlns:a16="http://schemas.microsoft.com/office/drawing/2014/main" id="{3DC64CA7-6A63-EDFE-6CBA-C81612222BC9}"/>
+              </a:ext>
+            </a:extLst>
+          </p:cNvPr>
+          <p:cNvSpPr txBox="1"/>
+          <p:nvPr/>
+        </p:nvSpPr>
+        <p:spPr>
+          <a:xfrm>
+            <a:off x="5220920" y="524051"/>
+            <a:ext cx="1750159" cy="584775"/>
+          </a:xfrm>
+          <a:prstGeom prst="rect">
+            <a:avLst/>
+          </a:prstGeom>
+          <a:ln w="28575">
+            <a:solidFill>
+              <a:schemeClr val="tx1"/>
+            </a:solidFill>
+          </a:ln>
+        </p:spPr>
+        <p:style>
+          <a:lnRef idx="2">
+            <a:schemeClr val="dk1"/>
+          </a:lnRef>
+          <a:fillRef idx="1">
+            <a:schemeClr val="lt1"/>
+          </a:fillRef>
+          <a:effectRef idx="0">
+            <a:schemeClr val="dk1"/>
+          </a:effectRef>
+          <a:fontRef idx="minor">
+            <a:schemeClr val="dk1"/>
+          </a:fontRef>
+        </p:style>
+        <p:txBody>
+          <a:bodyPr wrap="none" rtlCol="0">
+            <a:spAutoFit/>
+          </a:bodyPr>
+          <a:lstStyle/>
+          <a:p>
+            <a:r>
               <a:rPr lang="en-US" dirty="0" err="1"/>
-              <a:t>sbc</a:t>
+              <a:t>bcgov</a:t>
             </a:r>
             <a:r>
               <a:rPr lang="en-US" dirty="0"/>
-              <a:t>-auth/auth-web/</a:t>
-            </a:r>
+              <a:t>/</a:t>
+            </a:r>
+            <a:r>
+              <a:rPr lang="en-US" dirty="0" err="1"/>
+              <a:t>bcregistry</a:t>
+            </a:r>
+            <a:endParaRPr lang="en-US" dirty="0"/>
           </a:p>
           <a:p>
             <a:r>
@@ -3422,26 +3562,104 @@
               <a:t>BCROS home page</a:t>
             </a:r>
           </a:p>
-          <a:p>
-            <a:r>
-              <a:rPr lang="en-US" sz="1400" i="1" dirty="0"/>
-              <a:t>User/account management</a:t>
-            </a:r>
-          </a:p>
-          <a:p>
-            <a:r>
-              <a:rPr lang="en-US" sz="1400" i="1" dirty="0"/>
-              <a:t>Manage Businesses dashboard</a:t>
-            </a:r>
-          </a:p>
-        </p:txBody>
-      </p:sp>
-      <p:sp>
-        <p:nvSpPr>
-          <p:cNvPr id="5" name="TextBox 4">
-            <a:extLst>
-              <a:ext uri="{FF2B5EF4-FFF2-40B4-BE49-F238E27FC236}">
-                <a16:creationId xmlns:a16="http://schemas.microsoft.com/office/drawing/2014/main" id="{C3C93DF1-399E-457D-AFEF-704EEC9685EA}"/>
+        </p:txBody>
+      </p:sp>
+      <p:cxnSp>
+        <p:nvCxnSpPr>
+          <p:cNvPr id="45" name="Straight Arrow Connector 44">
+            <a:extLst>
+              <a:ext uri="{FF2B5EF4-FFF2-40B4-BE49-F238E27FC236}">
+                <a16:creationId xmlns:a16="http://schemas.microsoft.com/office/drawing/2014/main" id="{B80FDF62-9404-4E76-8C6E-2C9DB2D29877}"/>
+              </a:ext>
+            </a:extLst>
+          </p:cNvPr>
+          <p:cNvCxnSpPr>
+            <a:cxnSpLocks/>
+          </p:cNvCxnSpPr>
+          <p:nvPr/>
+        </p:nvCxnSpPr>
+        <p:spPr>
+          <a:xfrm>
+            <a:off x="5528887" y="4377790"/>
+            <a:ext cx="3430431" cy="0"/>
+          </a:xfrm>
+          <a:prstGeom prst="straightConnector1">
+            <a:avLst/>
+          </a:prstGeom>
+          <a:ln w="15875">
+            <a:solidFill>
+              <a:schemeClr val="tx1"/>
+            </a:solidFill>
+            <a:headEnd type="triangle"/>
+            <a:tailEnd type="triangle"/>
+          </a:ln>
+        </p:spPr>
+        <p:style>
+          <a:lnRef idx="1">
+            <a:schemeClr val="accent1"/>
+          </a:lnRef>
+          <a:fillRef idx="0">
+            <a:schemeClr val="accent1"/>
+          </a:fillRef>
+          <a:effectRef idx="0">
+            <a:schemeClr val="accent1"/>
+          </a:effectRef>
+          <a:fontRef idx="minor">
+            <a:schemeClr val="tx1"/>
+          </a:fontRef>
+        </p:style>
+      </p:cxnSp>
+      <p:cxnSp>
+        <p:nvCxnSpPr>
+          <p:cNvPr id="24" name="Straight Arrow Connector 23">
+            <a:extLst>
+              <a:ext uri="{FF2B5EF4-FFF2-40B4-BE49-F238E27FC236}">
+                <a16:creationId xmlns:a16="http://schemas.microsoft.com/office/drawing/2014/main" id="{866FF815-10DF-B9EF-EDD2-362ABE15F129}"/>
+              </a:ext>
+            </a:extLst>
+          </p:cNvPr>
+          <p:cNvCxnSpPr>
+            <a:cxnSpLocks/>
+          </p:cNvCxnSpPr>
+          <p:nvPr/>
+        </p:nvCxnSpPr>
+        <p:spPr>
+          <a:xfrm>
+            <a:off x="5528887" y="3848055"/>
+            <a:ext cx="412555" cy="5461"/>
+          </a:xfrm>
+          <a:prstGeom prst="straightConnector1">
+            <a:avLst/>
+          </a:prstGeom>
+          <a:ln w="15875">
+            <a:solidFill>
+              <a:schemeClr val="tx1"/>
+            </a:solidFill>
+            <a:headEnd type="triangle"/>
+            <a:tailEnd type="triangle"/>
+          </a:ln>
+        </p:spPr>
+        <p:style>
+          <a:lnRef idx="1">
+            <a:schemeClr val="accent1"/>
+          </a:lnRef>
+          <a:fillRef idx="0">
+            <a:schemeClr val="accent1"/>
+          </a:fillRef>
+          <a:effectRef idx="0">
+            <a:schemeClr val="accent1"/>
+          </a:effectRef>
+          <a:fontRef idx="minor">
+            <a:schemeClr val="tx1"/>
+          </a:fontRef>
+        </p:style>
+      </p:cxnSp>
+      <p:sp>
+        <p:nvSpPr>
+          <p:cNvPr id="34" name="TextBox 33">
+            <a:extLst>
+              <a:ext uri="{FF2B5EF4-FFF2-40B4-BE49-F238E27FC236}">
+                <a16:creationId xmlns:a16="http://schemas.microsoft.com/office/drawing/2014/main" id="{0A80A119-14E1-E6D9-39BF-0FB86A201074}"/>
               </a:ext>
             </a:extLst>
           </p:cNvPr>
@@ -3450,8 +3668,1257 @@
         </p:nvSpPr>
         <p:spPr>
           <a:xfrm>
-            <a:off x="3074610" y="2262608"/>
-            <a:ext cx="2196435" cy="1661993"/>
+            <a:off x="148290" y="6375184"/>
+            <a:ext cx="3596306" cy="338554"/>
+          </a:xfrm>
+          <a:prstGeom prst="rect">
+            <a:avLst/>
+          </a:prstGeom>
+          <a:noFill/>
+        </p:spPr>
+        <p:txBody>
+          <a:bodyPr wrap="none" rtlCol="0">
+            <a:spAutoFit/>
+          </a:bodyPr>
+          <a:lstStyle/>
+          <a:p>
+            <a:r>
+              <a:rPr lang="en-CA" sz="1600" dirty="0"/>
+              <a:t>BCROS: BC Registries and Online Services</a:t>
+            </a:r>
+          </a:p>
+        </p:txBody>
+      </p:sp>
+      <p:sp>
+        <p:nvSpPr>
+          <p:cNvPr id="35" name="TextBox 34">
+            <a:extLst>
+              <a:ext uri="{FF2B5EF4-FFF2-40B4-BE49-F238E27FC236}">
+                <a16:creationId xmlns:a16="http://schemas.microsoft.com/office/drawing/2014/main" id="{283149C0-CFEE-3047-CEE8-5371A30D8E3C}"/>
+              </a:ext>
+            </a:extLst>
+          </p:cNvPr>
+          <p:cNvSpPr txBox="1"/>
+          <p:nvPr/>
+        </p:nvSpPr>
+        <p:spPr>
+          <a:xfrm>
+            <a:off x="7574282" y="1824774"/>
+            <a:ext cx="806631" cy="523220"/>
+          </a:xfrm>
+          <a:prstGeom prst="rect">
+            <a:avLst/>
+          </a:prstGeom>
+          <a:ln w="28575">
+            <a:solidFill>
+              <a:schemeClr val="tx1"/>
+            </a:solidFill>
+          </a:ln>
+        </p:spPr>
+        <p:style>
+          <a:lnRef idx="2">
+            <a:schemeClr val="dk1"/>
+          </a:lnRef>
+          <a:fillRef idx="1">
+            <a:schemeClr val="lt1"/>
+          </a:fillRef>
+          <a:effectRef idx="0">
+            <a:schemeClr val="dk1"/>
+          </a:effectRef>
+          <a:fontRef idx="minor">
+            <a:schemeClr val="dk1"/>
+          </a:fontRef>
+        </p:style>
+        <p:txBody>
+          <a:bodyPr wrap="none" rtlCol="0">
+            <a:spAutoFit/>
+          </a:bodyPr>
+          <a:lstStyle/>
+          <a:p>
+            <a:r>
+              <a:rPr lang="en-US" sz="1400" i="1" dirty="0"/>
+              <a:t>Business</a:t>
+            </a:r>
+          </a:p>
+          <a:p>
+            <a:r>
+              <a:rPr lang="en-US" sz="1400" i="1" dirty="0"/>
+              <a:t>Search</a:t>
+            </a:r>
+          </a:p>
+        </p:txBody>
+      </p:sp>
+      <p:sp>
+        <p:nvSpPr>
+          <p:cNvPr id="36" name="TextBox 35">
+            <a:extLst>
+              <a:ext uri="{FF2B5EF4-FFF2-40B4-BE49-F238E27FC236}">
+                <a16:creationId xmlns:a16="http://schemas.microsoft.com/office/drawing/2014/main" id="{2FB566BC-A1A2-454E-FBE4-CFBD6E509627}"/>
+              </a:ext>
+            </a:extLst>
+          </p:cNvPr>
+          <p:cNvSpPr txBox="1"/>
+          <p:nvPr/>
+        </p:nvSpPr>
+        <p:spPr>
+          <a:xfrm>
+            <a:off x="9069109" y="1824774"/>
+            <a:ext cx="809837" cy="738664"/>
+          </a:xfrm>
+          <a:prstGeom prst="rect">
+            <a:avLst/>
+          </a:prstGeom>
+          <a:ln w="28575">
+            <a:solidFill>
+              <a:schemeClr val="tx1"/>
+            </a:solidFill>
+          </a:ln>
+        </p:spPr>
+        <p:style>
+          <a:lnRef idx="2">
+            <a:schemeClr val="dk1"/>
+          </a:lnRef>
+          <a:fillRef idx="1">
+            <a:schemeClr val="lt1"/>
+          </a:fillRef>
+          <a:effectRef idx="0">
+            <a:schemeClr val="dk1"/>
+          </a:effectRef>
+          <a:fontRef idx="minor">
+            <a:schemeClr val="dk1"/>
+          </a:fontRef>
+        </p:style>
+        <p:txBody>
+          <a:bodyPr wrap="none" rtlCol="0">
+            <a:spAutoFit/>
+          </a:bodyPr>
+          <a:lstStyle/>
+          <a:p>
+            <a:r>
+              <a:rPr lang="en-US" sz="1400" i="1" dirty="0"/>
+              <a:t>Personal</a:t>
+            </a:r>
+          </a:p>
+          <a:p>
+            <a:r>
+              <a:rPr lang="en-US" sz="1400" i="1" dirty="0"/>
+              <a:t>Property</a:t>
+            </a:r>
+          </a:p>
+          <a:p>
+            <a:r>
+              <a:rPr lang="en-US" sz="1400" i="1" dirty="0"/>
+              <a:t>Registry</a:t>
+            </a:r>
+          </a:p>
+        </p:txBody>
+      </p:sp>
+      <p:sp>
+        <p:nvSpPr>
+          <p:cNvPr id="37" name="TextBox 36">
+            <a:extLst>
+              <a:ext uri="{FF2B5EF4-FFF2-40B4-BE49-F238E27FC236}">
+                <a16:creationId xmlns:a16="http://schemas.microsoft.com/office/drawing/2014/main" id="{BAB1F037-73C9-ECB5-AD09-CCD1353EE10B}"/>
+              </a:ext>
+            </a:extLst>
+          </p:cNvPr>
+          <p:cNvSpPr txBox="1"/>
+          <p:nvPr/>
+        </p:nvSpPr>
+        <p:spPr>
+          <a:xfrm>
+            <a:off x="10475704" y="1824774"/>
+            <a:ext cx="526363" cy="307777"/>
+          </a:xfrm>
+          <a:prstGeom prst="rect">
+            <a:avLst/>
+          </a:prstGeom>
+          <a:ln w="28575">
+            <a:solidFill>
+              <a:schemeClr val="tx1"/>
+            </a:solidFill>
+          </a:ln>
+        </p:spPr>
+        <p:style>
+          <a:lnRef idx="2">
+            <a:schemeClr val="dk1"/>
+          </a:lnRef>
+          <a:fillRef idx="1">
+            <a:schemeClr val="lt1"/>
+          </a:fillRef>
+          <a:effectRef idx="0">
+            <a:schemeClr val="dk1"/>
+          </a:effectRef>
+          <a:fontRef idx="minor">
+            <a:schemeClr val="dk1"/>
+          </a:fontRef>
+        </p:style>
+        <p:txBody>
+          <a:bodyPr wrap="none" rtlCol="0">
+            <a:spAutoFit/>
+          </a:bodyPr>
+          <a:lstStyle/>
+          <a:p>
+            <a:r>
+              <a:rPr lang="en-US" sz="1400" i="1" dirty="0" err="1"/>
+              <a:t>etc</a:t>
+            </a:r>
+            <a:r>
+              <a:rPr lang="en-US" sz="1400" i="1" dirty="0"/>
+              <a:t>…</a:t>
+            </a:r>
+          </a:p>
+        </p:txBody>
+      </p:sp>
+      <p:cxnSp>
+        <p:nvCxnSpPr>
+          <p:cNvPr id="67" name="Straight Arrow Connector 66">
+            <a:extLst>
+              <a:ext uri="{FF2B5EF4-FFF2-40B4-BE49-F238E27FC236}">
+                <a16:creationId xmlns:a16="http://schemas.microsoft.com/office/drawing/2014/main" id="{AA12F04D-4BD8-4146-96AB-CAFE00202FB6}"/>
+              </a:ext>
+            </a:extLst>
+          </p:cNvPr>
+          <p:cNvCxnSpPr>
+            <a:cxnSpLocks/>
+          </p:cNvCxnSpPr>
+          <p:nvPr/>
+        </p:nvCxnSpPr>
+        <p:spPr>
+          <a:xfrm>
+            <a:off x="2369955" y="1470096"/>
+            <a:ext cx="9767" cy="344819"/>
+          </a:xfrm>
+          <a:prstGeom prst="straightConnector1">
+            <a:avLst/>
+          </a:prstGeom>
+          <a:ln w="15875">
+            <a:solidFill>
+              <a:schemeClr val="tx1"/>
+            </a:solidFill>
+            <a:tailEnd type="triangle"/>
+          </a:ln>
+        </p:spPr>
+        <p:style>
+          <a:lnRef idx="1">
+            <a:schemeClr val="accent1"/>
+          </a:lnRef>
+          <a:fillRef idx="0">
+            <a:schemeClr val="accent1"/>
+          </a:fillRef>
+          <a:effectRef idx="0">
+            <a:schemeClr val="accent1"/>
+          </a:effectRef>
+          <a:fontRef idx="minor">
+            <a:schemeClr val="tx1"/>
+          </a:fontRef>
+        </p:style>
+      </p:cxnSp>
+      <p:cxnSp>
+        <p:nvCxnSpPr>
+          <p:cNvPr id="78" name="Straight Arrow Connector 77">
+            <a:extLst>
+              <a:ext uri="{FF2B5EF4-FFF2-40B4-BE49-F238E27FC236}">
+                <a16:creationId xmlns:a16="http://schemas.microsoft.com/office/drawing/2014/main" id="{59B4E904-07DA-400D-92A1-1B3AB0EA14FF}"/>
+              </a:ext>
+            </a:extLst>
+          </p:cNvPr>
+          <p:cNvCxnSpPr>
+            <a:cxnSpLocks/>
+          </p:cNvCxnSpPr>
+          <p:nvPr/>
+        </p:nvCxnSpPr>
+        <p:spPr>
+          <a:xfrm flipV="1">
+            <a:off x="2360457" y="1462455"/>
+            <a:ext cx="8375169" cy="8749"/>
+          </a:xfrm>
+          <a:prstGeom prst="straightConnector1">
+            <a:avLst/>
+          </a:prstGeom>
+          <a:ln w="15875">
+            <a:solidFill>
+              <a:schemeClr val="tx1"/>
+            </a:solidFill>
+            <a:headEnd type="none"/>
+            <a:tailEnd type="none"/>
+          </a:ln>
+        </p:spPr>
+        <p:style>
+          <a:lnRef idx="1">
+            <a:schemeClr val="accent1"/>
+          </a:lnRef>
+          <a:fillRef idx="0">
+            <a:schemeClr val="accent1"/>
+          </a:fillRef>
+          <a:effectRef idx="0">
+            <a:schemeClr val="accent1"/>
+          </a:effectRef>
+          <a:fontRef idx="minor">
+            <a:schemeClr val="tx1"/>
+          </a:fontRef>
+        </p:style>
+      </p:cxnSp>
+      <p:cxnSp>
+        <p:nvCxnSpPr>
+          <p:cNvPr id="70" name="Straight Arrow Connector 69">
+            <a:extLst>
+              <a:ext uri="{FF2B5EF4-FFF2-40B4-BE49-F238E27FC236}">
+                <a16:creationId xmlns:a16="http://schemas.microsoft.com/office/drawing/2014/main" id="{61167A02-AD4C-1E7A-3C74-AE6390D5260A}"/>
+              </a:ext>
+            </a:extLst>
+          </p:cNvPr>
+          <p:cNvCxnSpPr>
+            <a:cxnSpLocks/>
+          </p:cNvCxnSpPr>
+          <p:nvPr/>
+        </p:nvCxnSpPr>
+        <p:spPr>
+          <a:xfrm>
+            <a:off x="5502362" y="1463915"/>
+            <a:ext cx="9767" cy="344819"/>
+          </a:xfrm>
+          <a:prstGeom prst="straightConnector1">
+            <a:avLst/>
+          </a:prstGeom>
+          <a:ln w="15875">
+            <a:solidFill>
+              <a:schemeClr val="tx1"/>
+            </a:solidFill>
+            <a:headEnd type="none"/>
+            <a:tailEnd type="triangle"/>
+          </a:ln>
+        </p:spPr>
+        <p:style>
+          <a:lnRef idx="1">
+            <a:schemeClr val="accent1"/>
+          </a:lnRef>
+          <a:fillRef idx="0">
+            <a:schemeClr val="accent1"/>
+          </a:fillRef>
+          <a:effectRef idx="0">
+            <a:schemeClr val="accent1"/>
+          </a:effectRef>
+          <a:fontRef idx="minor">
+            <a:schemeClr val="tx1"/>
+          </a:fontRef>
+        </p:style>
+      </p:cxnSp>
+      <p:cxnSp>
+        <p:nvCxnSpPr>
+          <p:cNvPr id="71" name="Straight Arrow Connector 70">
+            <a:extLst>
+              <a:ext uri="{FF2B5EF4-FFF2-40B4-BE49-F238E27FC236}">
+                <a16:creationId xmlns:a16="http://schemas.microsoft.com/office/drawing/2014/main" id="{EDF1CED3-A996-1D67-D896-4EE8A3913E94}"/>
+              </a:ext>
+            </a:extLst>
+          </p:cNvPr>
+          <p:cNvCxnSpPr>
+            <a:cxnSpLocks/>
+          </p:cNvCxnSpPr>
+          <p:nvPr/>
+        </p:nvCxnSpPr>
+        <p:spPr>
+          <a:xfrm>
+            <a:off x="7963344" y="1461045"/>
+            <a:ext cx="9767" cy="344819"/>
+          </a:xfrm>
+          <a:prstGeom prst="straightConnector1">
+            <a:avLst/>
+          </a:prstGeom>
+          <a:ln w="15875">
+            <a:solidFill>
+              <a:schemeClr val="tx1"/>
+            </a:solidFill>
+            <a:headEnd type="none"/>
+            <a:tailEnd type="triangle"/>
+          </a:ln>
+        </p:spPr>
+        <p:style>
+          <a:lnRef idx="1">
+            <a:schemeClr val="accent1"/>
+          </a:lnRef>
+          <a:fillRef idx="0">
+            <a:schemeClr val="accent1"/>
+          </a:fillRef>
+          <a:effectRef idx="0">
+            <a:schemeClr val="accent1"/>
+          </a:effectRef>
+          <a:fontRef idx="minor">
+            <a:schemeClr val="tx1"/>
+          </a:fontRef>
+        </p:style>
+      </p:cxnSp>
+      <p:cxnSp>
+        <p:nvCxnSpPr>
+          <p:cNvPr id="72" name="Straight Arrow Connector 71">
+            <a:extLst>
+              <a:ext uri="{FF2B5EF4-FFF2-40B4-BE49-F238E27FC236}">
+                <a16:creationId xmlns:a16="http://schemas.microsoft.com/office/drawing/2014/main" id="{0994F076-C201-74A7-A287-AD0BDD820D6C}"/>
+              </a:ext>
+            </a:extLst>
+          </p:cNvPr>
+          <p:cNvCxnSpPr>
+            <a:cxnSpLocks/>
+          </p:cNvCxnSpPr>
+          <p:nvPr/>
+        </p:nvCxnSpPr>
+        <p:spPr>
+          <a:xfrm>
+            <a:off x="9435266" y="1469794"/>
+            <a:ext cx="9767" cy="344819"/>
+          </a:xfrm>
+          <a:prstGeom prst="straightConnector1">
+            <a:avLst/>
+          </a:prstGeom>
+          <a:ln w="15875">
+            <a:solidFill>
+              <a:schemeClr val="tx1"/>
+            </a:solidFill>
+            <a:headEnd type="none"/>
+            <a:tailEnd type="triangle"/>
+          </a:ln>
+        </p:spPr>
+        <p:style>
+          <a:lnRef idx="1">
+            <a:schemeClr val="accent1"/>
+          </a:lnRef>
+          <a:fillRef idx="0">
+            <a:schemeClr val="accent1"/>
+          </a:fillRef>
+          <a:effectRef idx="0">
+            <a:schemeClr val="accent1"/>
+          </a:effectRef>
+          <a:fontRef idx="minor">
+            <a:schemeClr val="tx1"/>
+          </a:fontRef>
+        </p:style>
+      </p:cxnSp>
+      <p:cxnSp>
+        <p:nvCxnSpPr>
+          <p:cNvPr id="74" name="Straight Arrow Connector 73">
+            <a:extLst>
+              <a:ext uri="{FF2B5EF4-FFF2-40B4-BE49-F238E27FC236}">
+                <a16:creationId xmlns:a16="http://schemas.microsoft.com/office/drawing/2014/main" id="{A3DE5DA7-074D-46AA-3316-75BB37AF96EA}"/>
+              </a:ext>
+            </a:extLst>
+          </p:cNvPr>
+          <p:cNvCxnSpPr>
+            <a:cxnSpLocks/>
+          </p:cNvCxnSpPr>
+          <p:nvPr/>
+        </p:nvCxnSpPr>
+        <p:spPr>
+          <a:xfrm>
+            <a:off x="10725466" y="1461045"/>
+            <a:ext cx="9767" cy="344819"/>
+          </a:xfrm>
+          <a:prstGeom prst="straightConnector1">
+            <a:avLst/>
+          </a:prstGeom>
+          <a:ln w="15875">
+            <a:solidFill>
+              <a:schemeClr val="tx1"/>
+            </a:solidFill>
+            <a:tailEnd type="triangle"/>
+          </a:ln>
+        </p:spPr>
+        <p:style>
+          <a:lnRef idx="1">
+            <a:schemeClr val="accent1"/>
+          </a:lnRef>
+          <a:fillRef idx="0">
+            <a:schemeClr val="accent1"/>
+          </a:fillRef>
+          <a:effectRef idx="0">
+            <a:schemeClr val="accent1"/>
+          </a:effectRef>
+          <a:fontRef idx="minor">
+            <a:schemeClr val="tx1"/>
+          </a:fontRef>
+        </p:style>
+      </p:cxnSp>
+      <p:cxnSp>
+        <p:nvCxnSpPr>
+          <p:cNvPr id="81" name="Straight Arrow Connector 80">
+            <a:extLst>
+              <a:ext uri="{FF2B5EF4-FFF2-40B4-BE49-F238E27FC236}">
+                <a16:creationId xmlns:a16="http://schemas.microsoft.com/office/drawing/2014/main" id="{B35FF80B-8A4A-7C9E-ACAD-22DDD51DD484}"/>
+              </a:ext>
+            </a:extLst>
+          </p:cNvPr>
+          <p:cNvCxnSpPr>
+            <a:cxnSpLocks/>
+            <a:stCxn id="11" idx="2"/>
+          </p:cNvCxnSpPr>
+          <p:nvPr/>
+        </p:nvCxnSpPr>
+        <p:spPr>
+          <a:xfrm flipH="1">
+            <a:off x="6095999" y="1108826"/>
+            <a:ext cx="1" cy="371128"/>
+          </a:xfrm>
+          <a:prstGeom prst="straightConnector1">
+            <a:avLst/>
+          </a:prstGeom>
+          <a:ln w="15875">
+            <a:solidFill>
+              <a:schemeClr val="tx1"/>
+            </a:solidFill>
+            <a:headEnd type="none"/>
+            <a:tailEnd type="none"/>
+          </a:ln>
+        </p:spPr>
+        <p:style>
+          <a:lnRef idx="1">
+            <a:schemeClr val="accent1"/>
+          </a:lnRef>
+          <a:fillRef idx="0">
+            <a:schemeClr val="accent1"/>
+          </a:fillRef>
+          <a:effectRef idx="0">
+            <a:schemeClr val="accent1"/>
+          </a:effectRef>
+          <a:fontRef idx="minor">
+            <a:schemeClr val="tx1"/>
+          </a:fontRef>
+        </p:style>
+      </p:cxnSp>
+      <p:grpSp>
+        <p:nvGrpSpPr>
+          <p:cNvPr id="92" name="Group 91">
+            <a:extLst>
+              <a:ext uri="{FF2B5EF4-FFF2-40B4-BE49-F238E27FC236}">
+                <a16:creationId xmlns:a16="http://schemas.microsoft.com/office/drawing/2014/main" id="{267F7BDC-032A-E199-7CBB-19493FA17A67}"/>
+              </a:ext>
+            </a:extLst>
+          </p:cNvPr>
+          <p:cNvGrpSpPr/>
+          <p:nvPr/>
+        </p:nvGrpSpPr>
+        <p:grpSpPr>
+          <a:xfrm>
+            <a:off x="4382012" y="1824774"/>
+            <a:ext cx="2744476" cy="800219"/>
+            <a:chOff x="4321052" y="1824774"/>
+            <a:chExt cx="2744476" cy="800219"/>
+          </a:xfrm>
+        </p:grpSpPr>
+        <p:sp>
+          <p:nvSpPr>
+            <p:cNvPr id="8" name="TextBox 7">
+              <a:extLst>
+                <a:ext uri="{FF2B5EF4-FFF2-40B4-BE49-F238E27FC236}">
+                  <a16:creationId xmlns:a16="http://schemas.microsoft.com/office/drawing/2014/main" id="{D6CB8EDC-0E78-49DD-B92F-4DF7897A543F}"/>
+                </a:ext>
+              </a:extLst>
+            </p:cNvPr>
+            <p:cNvSpPr txBox="1"/>
+            <p:nvPr/>
+          </p:nvSpPr>
+          <p:spPr>
+            <a:xfrm>
+              <a:off x="4321052" y="1824774"/>
+              <a:ext cx="2260234" cy="800219"/>
+            </a:xfrm>
+            <a:prstGeom prst="rect">
+              <a:avLst/>
+            </a:prstGeom>
+            <a:ln w="28575">
+              <a:solidFill>
+                <a:schemeClr val="tx1"/>
+              </a:solidFill>
+            </a:ln>
+          </p:spPr>
+          <p:style>
+            <a:lnRef idx="2">
+              <a:schemeClr val="dk1"/>
+            </a:lnRef>
+            <a:fillRef idx="1">
+              <a:schemeClr val="lt1"/>
+            </a:fillRef>
+            <a:effectRef idx="0">
+              <a:schemeClr val="dk1"/>
+            </a:effectRef>
+            <a:fontRef idx="minor">
+              <a:schemeClr val="dk1"/>
+            </a:fontRef>
+          </p:style>
+          <p:txBody>
+            <a:bodyPr wrap="none" rtlCol="0">
+              <a:spAutoFit/>
+            </a:bodyPr>
+            <a:lstStyle/>
+            <a:p>
+              <a:r>
+                <a:rPr lang="en-US" dirty="0" err="1"/>
+                <a:t>bcgov</a:t>
+              </a:r>
+              <a:r>
+                <a:rPr lang="en-US" dirty="0"/>
+                <a:t>/</a:t>
+              </a:r>
+              <a:r>
+                <a:rPr lang="en-US" dirty="0" err="1"/>
+                <a:t>namerequest</a:t>
+              </a:r>
+              <a:endParaRPr lang="en-US" dirty="0"/>
+            </a:p>
+            <a:p>
+              <a:r>
+                <a:rPr lang="en-US" sz="1400" i="1" dirty="0"/>
+                <a:t>- Request a Business Name</a:t>
+              </a:r>
+            </a:p>
+            <a:p>
+              <a:r>
+                <a:rPr lang="en-US" sz="1400" i="1" dirty="0"/>
+                <a:t>- Manage My Name Request</a:t>
+              </a:r>
+            </a:p>
+          </p:txBody>
+        </p:sp>
+        <p:pic>
+          <p:nvPicPr>
+            <p:cNvPr id="86" name="Graphic 85" descr="Database outline">
+              <a:extLst>
+                <a:ext uri="{FF2B5EF4-FFF2-40B4-BE49-F238E27FC236}">
+                  <a16:creationId xmlns:a16="http://schemas.microsoft.com/office/drawing/2014/main" id="{C78B5842-03EF-F3A8-4A4A-EA5C8E9022B1}"/>
+                </a:ext>
+              </a:extLst>
+            </p:cNvPr>
+            <p:cNvPicPr>
+              <a:picLocks noChangeAspect="1"/>
+            </p:cNvPicPr>
+            <p:nvPr/>
+          </p:nvPicPr>
+          <p:blipFill>
+            <a:blip r:embed="rId2">
+              <a:extLst>
+                <a:ext uri="{28A0092B-C50C-407E-A947-70E740481C1C}">
+                  <a14:useLocalDpi xmlns:a14="http://schemas.microsoft.com/office/drawing/2010/main" val="0"/>
+                </a:ext>
+                <a:ext uri="{96DAC541-7B7A-43D3-8B79-37D633B846F1}">
+                  <asvg:svgBlip xmlns:asvg="http://schemas.microsoft.com/office/drawing/2016/SVG/main" r:embed="rId3"/>
+                </a:ext>
+              </a:extLst>
+            </a:blip>
+            <a:stretch>
+              <a:fillRect/>
+            </a:stretch>
+          </p:blipFill>
+          <p:spPr>
+            <a:xfrm>
+              <a:off x="6513617" y="1946680"/>
+              <a:ext cx="551911" cy="551911"/>
+            </a:xfrm>
+            <a:prstGeom prst="rect">
+              <a:avLst/>
+            </a:prstGeom>
+          </p:spPr>
+        </p:pic>
+      </p:grpSp>
+      <p:grpSp>
+        <p:nvGrpSpPr>
+          <p:cNvPr id="93" name="Group 92">
+            <a:extLst>
+              <a:ext uri="{FF2B5EF4-FFF2-40B4-BE49-F238E27FC236}">
+                <a16:creationId xmlns:a16="http://schemas.microsoft.com/office/drawing/2014/main" id="{9DEBEC36-7C2B-37B4-B9F1-1D2BD7164940}"/>
+              </a:ext>
+            </a:extLst>
+          </p:cNvPr>
+          <p:cNvGrpSpPr/>
+          <p:nvPr/>
+        </p:nvGrpSpPr>
+        <p:grpSpPr>
+          <a:xfrm>
+            <a:off x="1178711" y="5287551"/>
+            <a:ext cx="2014373" cy="584775"/>
+            <a:chOff x="3360707" y="5818602"/>
+            <a:chExt cx="2014373" cy="584775"/>
+          </a:xfrm>
+        </p:grpSpPr>
+        <p:sp>
+          <p:nvSpPr>
+            <p:cNvPr id="22" name="TextBox 21">
+              <a:extLst>
+                <a:ext uri="{FF2B5EF4-FFF2-40B4-BE49-F238E27FC236}">
+                  <a16:creationId xmlns:a16="http://schemas.microsoft.com/office/drawing/2014/main" id="{EF69ABAB-BB88-4BCA-B31A-C7957D38B3F2}"/>
+                </a:ext>
+              </a:extLst>
+            </p:cNvPr>
+            <p:cNvSpPr txBox="1"/>
+            <p:nvPr/>
+          </p:nvSpPr>
+          <p:spPr>
+            <a:xfrm>
+              <a:off x="3360707" y="5818602"/>
+              <a:ext cx="1534266" cy="584775"/>
+            </a:xfrm>
+            <a:prstGeom prst="rect">
+              <a:avLst/>
+            </a:prstGeom>
+            <a:ln w="28575">
+              <a:solidFill>
+                <a:srgbClr val="0070C0"/>
+              </a:solidFill>
+            </a:ln>
+          </p:spPr>
+          <p:style>
+            <a:lnRef idx="2">
+              <a:schemeClr val="dk1"/>
+            </a:lnRef>
+            <a:fillRef idx="1">
+              <a:schemeClr val="lt1"/>
+            </a:fillRef>
+            <a:effectRef idx="0">
+              <a:schemeClr val="dk1"/>
+            </a:effectRef>
+            <a:fontRef idx="minor">
+              <a:schemeClr val="dk1"/>
+            </a:fontRef>
+          </p:style>
+          <p:txBody>
+            <a:bodyPr wrap="none" rtlCol="0">
+              <a:spAutoFit/>
+            </a:bodyPr>
+            <a:lstStyle/>
+            <a:p>
+              <a:r>
+                <a:rPr lang="en-US" dirty="0" err="1"/>
+                <a:t>bcgov</a:t>
+              </a:r>
+              <a:r>
+                <a:rPr lang="en-US" dirty="0"/>
+                <a:t>/</a:t>
+              </a:r>
+              <a:r>
+                <a:rPr lang="en-US" dirty="0" err="1"/>
+                <a:t>sbc</a:t>
+              </a:r>
+              <a:r>
+                <a:rPr lang="en-US" dirty="0"/>
+                <a:t>-pay</a:t>
+              </a:r>
+            </a:p>
+            <a:p>
+              <a:r>
+                <a:rPr lang="en-US" sz="1400" i="1" dirty="0"/>
+                <a:t>Pay API + UI</a:t>
+              </a:r>
+            </a:p>
+          </p:txBody>
+        </p:sp>
+        <p:pic>
+          <p:nvPicPr>
+            <p:cNvPr id="87" name="Graphic 86" descr="Database outline">
+              <a:extLst>
+                <a:ext uri="{FF2B5EF4-FFF2-40B4-BE49-F238E27FC236}">
+                  <a16:creationId xmlns:a16="http://schemas.microsoft.com/office/drawing/2014/main" id="{C5A0F418-34A7-8184-A293-59F627BDF879}"/>
+                </a:ext>
+              </a:extLst>
+            </p:cNvPr>
+            <p:cNvPicPr>
+              <a:picLocks noChangeAspect="1"/>
+            </p:cNvPicPr>
+            <p:nvPr/>
+          </p:nvPicPr>
+          <p:blipFill>
+            <a:blip r:embed="rId2">
+              <a:extLst>
+                <a:ext uri="{28A0092B-C50C-407E-A947-70E740481C1C}">
+                  <a14:useLocalDpi xmlns:a14="http://schemas.microsoft.com/office/drawing/2010/main" val="0"/>
+                </a:ext>
+                <a:ext uri="{96DAC541-7B7A-43D3-8B79-37D633B846F1}">
+                  <asvg:svgBlip xmlns:asvg="http://schemas.microsoft.com/office/drawing/2016/SVG/main" r:embed="rId3"/>
+                </a:ext>
+              </a:extLst>
+            </a:blip>
+            <a:stretch>
+              <a:fillRect/>
+            </a:stretch>
+          </p:blipFill>
+          <p:spPr>
+            <a:xfrm>
+              <a:off x="4823169" y="5838922"/>
+              <a:ext cx="551911" cy="551911"/>
+            </a:xfrm>
+            <a:prstGeom prst="rect">
+              <a:avLst/>
+            </a:prstGeom>
+          </p:spPr>
+        </p:pic>
+      </p:grpSp>
+      <p:grpSp>
+        <p:nvGrpSpPr>
+          <p:cNvPr id="91" name="Group 90">
+            <a:extLst>
+              <a:ext uri="{FF2B5EF4-FFF2-40B4-BE49-F238E27FC236}">
+                <a16:creationId xmlns:a16="http://schemas.microsoft.com/office/drawing/2014/main" id="{3B23096B-70D0-9664-4F31-F4009714C043}"/>
+              </a:ext>
+            </a:extLst>
+          </p:cNvPr>
+          <p:cNvGrpSpPr/>
+          <p:nvPr/>
+        </p:nvGrpSpPr>
+        <p:grpSpPr>
+          <a:xfrm>
+            <a:off x="5890184" y="5289934"/>
+            <a:ext cx="1982431" cy="800219"/>
+            <a:chOff x="4922845" y="4940081"/>
+            <a:chExt cx="1982431" cy="800219"/>
+          </a:xfrm>
+        </p:grpSpPr>
+        <p:sp>
+          <p:nvSpPr>
+            <p:cNvPr id="33" name="TextBox 32">
+              <a:extLst>
+                <a:ext uri="{FF2B5EF4-FFF2-40B4-BE49-F238E27FC236}">
+                  <a16:creationId xmlns:a16="http://schemas.microsoft.com/office/drawing/2014/main" id="{9D1391EA-5F11-5B69-4A9A-2DC1A50BF3BD}"/>
+                </a:ext>
+              </a:extLst>
+            </p:cNvPr>
+            <p:cNvSpPr txBox="1"/>
+            <p:nvPr/>
+          </p:nvSpPr>
+          <p:spPr>
+            <a:xfrm>
+              <a:off x="4922845" y="4940081"/>
+              <a:ext cx="1502912" cy="800219"/>
+            </a:xfrm>
+            <a:prstGeom prst="rect">
+              <a:avLst/>
+            </a:prstGeom>
+            <a:ln w="28575">
+              <a:solidFill>
+                <a:schemeClr val="accent6"/>
+              </a:solidFill>
+            </a:ln>
+          </p:spPr>
+          <p:style>
+            <a:lnRef idx="2">
+              <a:schemeClr val="dk1"/>
+            </a:lnRef>
+            <a:fillRef idx="1">
+              <a:schemeClr val="lt1"/>
+            </a:fillRef>
+            <a:effectRef idx="0">
+              <a:schemeClr val="dk1"/>
+            </a:effectRef>
+            <a:fontRef idx="minor">
+              <a:schemeClr val="dk1"/>
+            </a:fontRef>
+          </p:style>
+          <p:txBody>
+            <a:bodyPr wrap="none" rtlCol="0">
+              <a:spAutoFit/>
+            </a:bodyPr>
+            <a:lstStyle/>
+            <a:p>
+              <a:r>
+                <a:rPr lang="en-US" dirty="0" err="1"/>
+                <a:t>bcgov</a:t>
+              </a:r>
+              <a:r>
+                <a:rPr lang="en-US" dirty="0"/>
+                <a:t>/</a:t>
+              </a:r>
+              <a:r>
+                <a:rPr lang="en-US" dirty="0" err="1"/>
+                <a:t>lear</a:t>
+              </a:r>
+              <a:endParaRPr lang="en-US" dirty="0"/>
+            </a:p>
+            <a:p>
+              <a:r>
+                <a:rPr lang="en-US" sz="1400" i="1" dirty="0"/>
+                <a:t>Legal API:</a:t>
+              </a:r>
+            </a:p>
+            <a:p>
+              <a:r>
+                <a:rPr lang="en-US" sz="1400" i="1" dirty="0"/>
+                <a:t>- Emailer, Filer, </a:t>
+              </a:r>
+              <a:r>
+                <a:rPr lang="en-US" sz="1400" i="1" dirty="0" err="1"/>
+                <a:t>etc</a:t>
+              </a:r>
+              <a:endParaRPr lang="en-US" sz="1400" i="1" dirty="0"/>
+            </a:p>
+          </p:txBody>
+        </p:sp>
+        <p:pic>
+          <p:nvPicPr>
+            <p:cNvPr id="88" name="Graphic 87" descr="Database outline">
+              <a:extLst>
+                <a:ext uri="{FF2B5EF4-FFF2-40B4-BE49-F238E27FC236}">
+                  <a16:creationId xmlns:a16="http://schemas.microsoft.com/office/drawing/2014/main" id="{004BB3D5-99C5-38EB-35D0-64DD07532A6B}"/>
+                </a:ext>
+              </a:extLst>
+            </p:cNvPr>
+            <p:cNvPicPr>
+              <a:picLocks noChangeAspect="1"/>
+            </p:cNvPicPr>
+            <p:nvPr/>
+          </p:nvPicPr>
+          <p:blipFill>
+            <a:blip r:embed="rId2">
+              <a:extLst>
+                <a:ext uri="{28A0092B-C50C-407E-A947-70E740481C1C}">
+                  <a14:useLocalDpi xmlns:a14="http://schemas.microsoft.com/office/drawing/2010/main" val="0"/>
+                </a:ext>
+                <a:ext uri="{96DAC541-7B7A-43D3-8B79-37D633B846F1}">
+                  <asvg:svgBlip xmlns:asvg="http://schemas.microsoft.com/office/drawing/2016/SVG/main" r:embed="rId3"/>
+                </a:ext>
+              </a:extLst>
+            </a:blip>
+            <a:stretch>
+              <a:fillRect/>
+            </a:stretch>
+          </p:blipFill>
+          <p:spPr>
+            <a:xfrm>
+              <a:off x="6353365" y="5068199"/>
+              <a:ext cx="551911" cy="551911"/>
+            </a:xfrm>
+            <a:prstGeom prst="rect">
+              <a:avLst/>
+            </a:prstGeom>
+          </p:spPr>
+        </p:pic>
+      </p:grpSp>
+      <p:cxnSp>
+        <p:nvCxnSpPr>
+          <p:cNvPr id="73" name="Straight Arrow Connector 72">
+            <a:extLst>
+              <a:ext uri="{FF2B5EF4-FFF2-40B4-BE49-F238E27FC236}">
+                <a16:creationId xmlns:a16="http://schemas.microsoft.com/office/drawing/2014/main" id="{699D0FFC-7D8F-4C2D-B81B-D956212BFFF1}"/>
+              </a:ext>
+            </a:extLst>
+          </p:cNvPr>
+          <p:cNvCxnSpPr>
+            <a:cxnSpLocks/>
+          </p:cNvCxnSpPr>
+          <p:nvPr/>
+        </p:nvCxnSpPr>
+        <p:spPr>
+          <a:xfrm>
+            <a:off x="3309261" y="3055880"/>
+            <a:ext cx="0" cy="556048"/>
+          </a:xfrm>
+          <a:prstGeom prst="straightConnector1">
+            <a:avLst/>
+          </a:prstGeom>
+          <a:ln w="15875">
+            <a:solidFill>
+              <a:schemeClr val="tx1"/>
+            </a:solidFill>
+            <a:headEnd type="none"/>
+            <a:tailEnd type="triangle"/>
+          </a:ln>
+        </p:spPr>
+        <p:style>
+          <a:lnRef idx="1">
+            <a:schemeClr val="accent1"/>
+          </a:lnRef>
+          <a:fillRef idx="0">
+            <a:schemeClr val="accent1"/>
+          </a:fillRef>
+          <a:effectRef idx="0">
+            <a:schemeClr val="accent1"/>
+          </a:effectRef>
+          <a:fontRef idx="minor">
+            <a:schemeClr val="tx1"/>
+          </a:fontRef>
+        </p:style>
+      </p:cxnSp>
+      <p:cxnSp>
+        <p:nvCxnSpPr>
+          <p:cNvPr id="100" name="Straight Arrow Connector 99">
+            <a:extLst>
+              <a:ext uri="{FF2B5EF4-FFF2-40B4-BE49-F238E27FC236}">
+                <a16:creationId xmlns:a16="http://schemas.microsoft.com/office/drawing/2014/main" id="{FAB02239-3CDF-8BE6-0F50-3D1F490413A8}"/>
+              </a:ext>
+            </a:extLst>
+          </p:cNvPr>
+          <p:cNvCxnSpPr>
+            <a:cxnSpLocks/>
+          </p:cNvCxnSpPr>
+          <p:nvPr/>
+        </p:nvCxnSpPr>
+        <p:spPr>
+          <a:xfrm>
+            <a:off x="6602517" y="4957633"/>
+            <a:ext cx="0" cy="340078"/>
+          </a:xfrm>
+          <a:prstGeom prst="straightConnector1">
+            <a:avLst/>
+          </a:prstGeom>
+          <a:ln w="15875">
+            <a:solidFill>
+              <a:schemeClr val="tx1"/>
+            </a:solidFill>
+            <a:headEnd type="none"/>
+            <a:tailEnd type="triangle"/>
+          </a:ln>
+        </p:spPr>
+        <p:style>
+          <a:lnRef idx="1">
+            <a:schemeClr val="accent1"/>
+          </a:lnRef>
+          <a:fillRef idx="0">
+            <a:schemeClr val="accent1"/>
+          </a:fillRef>
+          <a:effectRef idx="0">
+            <a:schemeClr val="accent1"/>
+          </a:effectRef>
+          <a:fontRef idx="minor">
+            <a:schemeClr val="tx1"/>
+          </a:fontRef>
+        </p:style>
+      </p:cxnSp>
+      <p:cxnSp>
+        <p:nvCxnSpPr>
+          <p:cNvPr id="101" name="Straight Arrow Connector 100">
+            <a:extLst>
+              <a:ext uri="{FF2B5EF4-FFF2-40B4-BE49-F238E27FC236}">
+                <a16:creationId xmlns:a16="http://schemas.microsoft.com/office/drawing/2014/main" id="{05E0D8CC-D37C-DA19-5E16-94DF35ED1FB2}"/>
+              </a:ext>
+            </a:extLst>
+          </p:cNvPr>
+          <p:cNvCxnSpPr>
+            <a:cxnSpLocks/>
+          </p:cNvCxnSpPr>
+          <p:nvPr/>
+        </p:nvCxnSpPr>
+        <p:spPr>
+          <a:xfrm flipV="1">
+            <a:off x="4096142" y="4953839"/>
+            <a:ext cx="6000358" cy="14690"/>
+          </a:xfrm>
+          <a:prstGeom prst="straightConnector1">
+            <a:avLst/>
+          </a:prstGeom>
+          <a:ln w="15875">
+            <a:solidFill>
+              <a:schemeClr val="tx1"/>
+            </a:solidFill>
+            <a:headEnd type="none"/>
+            <a:tailEnd type="none"/>
+          </a:ln>
+        </p:spPr>
+        <p:style>
+          <a:lnRef idx="1">
+            <a:schemeClr val="accent1"/>
+          </a:lnRef>
+          <a:fillRef idx="0">
+            <a:schemeClr val="accent1"/>
+          </a:fillRef>
+          <a:effectRef idx="0">
+            <a:schemeClr val="accent1"/>
+          </a:effectRef>
+          <a:fontRef idx="minor">
+            <a:schemeClr val="tx1"/>
+          </a:fontRef>
+        </p:style>
+      </p:cxnSp>
+      <p:cxnSp>
+        <p:nvCxnSpPr>
+          <p:cNvPr id="103" name="Straight Arrow Connector 102">
+            <a:extLst>
+              <a:ext uri="{FF2B5EF4-FFF2-40B4-BE49-F238E27FC236}">
+                <a16:creationId xmlns:a16="http://schemas.microsoft.com/office/drawing/2014/main" id="{1D0F6F88-3201-3BEB-BCA8-23DF5EB93B99}"/>
+              </a:ext>
+            </a:extLst>
+          </p:cNvPr>
+          <p:cNvCxnSpPr>
+            <a:cxnSpLocks/>
+          </p:cNvCxnSpPr>
+          <p:nvPr/>
+        </p:nvCxnSpPr>
+        <p:spPr>
+          <a:xfrm>
+            <a:off x="4106302" y="4624029"/>
+            <a:ext cx="0" cy="332193"/>
+          </a:xfrm>
+          <a:prstGeom prst="straightConnector1">
+            <a:avLst/>
+          </a:prstGeom>
+          <a:ln w="15875">
+            <a:solidFill>
+              <a:schemeClr val="tx1"/>
+            </a:solidFill>
+            <a:headEnd type="none"/>
+            <a:tailEnd type="none"/>
+          </a:ln>
+        </p:spPr>
+        <p:style>
+          <a:lnRef idx="1">
+            <a:schemeClr val="accent1"/>
+          </a:lnRef>
+          <a:fillRef idx="0">
+            <a:schemeClr val="accent1"/>
+          </a:fillRef>
+          <a:effectRef idx="0">
+            <a:schemeClr val="accent1"/>
+          </a:effectRef>
+          <a:fontRef idx="minor">
+            <a:schemeClr val="tx1"/>
+          </a:fontRef>
+        </p:style>
+      </p:cxnSp>
+      <p:cxnSp>
+        <p:nvCxnSpPr>
+          <p:cNvPr id="104" name="Straight Arrow Connector 103">
+            <a:extLst>
+              <a:ext uri="{FF2B5EF4-FFF2-40B4-BE49-F238E27FC236}">
+                <a16:creationId xmlns:a16="http://schemas.microsoft.com/office/drawing/2014/main" id="{54A06009-34EE-6750-CCFE-7DE2083D352A}"/>
+              </a:ext>
+            </a:extLst>
+          </p:cNvPr>
+          <p:cNvCxnSpPr>
+            <a:cxnSpLocks/>
+          </p:cNvCxnSpPr>
+          <p:nvPr/>
+        </p:nvCxnSpPr>
+        <p:spPr>
+          <a:xfrm flipH="1">
+            <a:off x="7254262" y="4437615"/>
+            <a:ext cx="9238" cy="512786"/>
+          </a:xfrm>
+          <a:prstGeom prst="straightConnector1">
+            <a:avLst/>
+          </a:prstGeom>
+          <a:ln w="15875">
+            <a:solidFill>
+              <a:schemeClr val="tx1"/>
+            </a:solidFill>
+            <a:headEnd type="none"/>
+            <a:tailEnd type="none"/>
+          </a:ln>
+        </p:spPr>
+        <p:style>
+          <a:lnRef idx="1">
+            <a:schemeClr val="accent1"/>
+          </a:lnRef>
+          <a:fillRef idx="0">
+            <a:schemeClr val="accent1"/>
+          </a:fillRef>
+          <a:effectRef idx="0">
+            <a:schemeClr val="accent1"/>
+          </a:effectRef>
+          <a:fontRef idx="minor">
+            <a:schemeClr val="tx1"/>
+          </a:fontRef>
+        </p:style>
+      </p:cxnSp>
+      <p:cxnSp>
+        <p:nvCxnSpPr>
+          <p:cNvPr id="112" name="Straight Arrow Connector 111">
+            <a:extLst>
+              <a:ext uri="{FF2B5EF4-FFF2-40B4-BE49-F238E27FC236}">
+                <a16:creationId xmlns:a16="http://schemas.microsoft.com/office/drawing/2014/main" id="{6BD81363-2846-BE4A-0821-807D196C5FFB}"/>
+              </a:ext>
+            </a:extLst>
+          </p:cNvPr>
+          <p:cNvCxnSpPr>
+            <a:cxnSpLocks/>
+          </p:cNvCxnSpPr>
+          <p:nvPr/>
+        </p:nvCxnSpPr>
+        <p:spPr>
+          <a:xfrm>
+            <a:off x="10086340" y="4624029"/>
+            <a:ext cx="0" cy="332193"/>
+          </a:xfrm>
+          <a:prstGeom prst="straightConnector1">
+            <a:avLst/>
+          </a:prstGeom>
+          <a:ln w="15875">
+            <a:solidFill>
+              <a:schemeClr val="tx1"/>
+            </a:solidFill>
+            <a:headEnd type="none"/>
+            <a:tailEnd type="none"/>
+          </a:ln>
+        </p:spPr>
+        <p:style>
+          <a:lnRef idx="1">
+            <a:schemeClr val="accent1"/>
+          </a:lnRef>
+          <a:fillRef idx="0">
+            <a:schemeClr val="accent1"/>
+          </a:fillRef>
+          <a:effectRef idx="0">
+            <a:schemeClr val="accent1"/>
+          </a:effectRef>
+          <a:fontRef idx="minor">
+            <a:schemeClr val="tx1"/>
+          </a:fontRef>
+        </p:style>
+      </p:cxnSp>
+      <p:cxnSp>
+        <p:nvCxnSpPr>
+          <p:cNvPr id="123" name="Straight Arrow Connector 122">
+            <a:extLst>
+              <a:ext uri="{FF2B5EF4-FFF2-40B4-BE49-F238E27FC236}">
+                <a16:creationId xmlns:a16="http://schemas.microsoft.com/office/drawing/2014/main" id="{AAE8E72A-6DA4-0706-AE8F-50032EAB37BE}"/>
+              </a:ext>
+            </a:extLst>
+          </p:cNvPr>
+          <p:cNvCxnSpPr>
+            <a:cxnSpLocks/>
+          </p:cNvCxnSpPr>
+          <p:nvPr/>
+        </p:nvCxnSpPr>
+        <p:spPr>
+          <a:xfrm flipH="1">
+            <a:off x="7254262" y="4185593"/>
+            <a:ext cx="9238" cy="163390"/>
+          </a:xfrm>
+          <a:prstGeom prst="straightConnector1">
+            <a:avLst/>
+          </a:prstGeom>
+          <a:ln w="15875">
+            <a:solidFill>
+              <a:schemeClr val="tx1"/>
+            </a:solidFill>
+            <a:headEnd type="none"/>
+            <a:tailEnd type="none"/>
+          </a:ln>
+        </p:spPr>
+        <p:style>
+          <a:lnRef idx="1">
+            <a:schemeClr val="accent1"/>
+          </a:lnRef>
+          <a:fillRef idx="0">
+            <a:schemeClr val="accent1"/>
+          </a:fillRef>
+          <a:effectRef idx="0">
+            <a:schemeClr val="accent1"/>
+          </a:effectRef>
+          <a:fontRef idx="minor">
+            <a:schemeClr val="tx1"/>
+          </a:fontRef>
+        </p:style>
+      </p:cxnSp>
+      <p:sp>
+        <p:nvSpPr>
+          <p:cNvPr id="6" name="TextBox 5">
+            <a:extLst>
+              <a:ext uri="{FF2B5EF4-FFF2-40B4-BE49-F238E27FC236}">
+                <a16:creationId xmlns:a16="http://schemas.microsoft.com/office/drawing/2014/main" id="{F30146CC-2A09-42F7-88C1-7DD004BF8F4A}"/>
+              </a:ext>
+            </a:extLst>
+          </p:cNvPr>
+          <p:cNvSpPr txBox="1"/>
+          <p:nvPr/>
+        </p:nvSpPr>
+        <p:spPr>
+          <a:xfrm>
+            <a:off x="5941442" y="3611928"/>
+            <a:ext cx="2623795" cy="584775"/>
           </a:xfrm>
           <a:prstGeom prst="rect">
             <a:avLst/>
@@ -3483,62 +4950,33 @@
           <a:lstStyle/>
           <a:p>
             <a:r>
+              <a:rPr lang="en-US" dirty="0" err="1"/>
+              <a:t>bcgov</a:t>
+            </a:r>
+            <a:r>
               <a:rPr lang="en-US" dirty="0"/>
-              <a:t>business-filings-</a:t>
+              <a:t>/business-create-</a:t>
             </a:r>
             <a:r>
               <a:rPr lang="en-US" dirty="0" err="1"/>
               <a:t>ui</a:t>
             </a:r>
-            <a:r>
-              <a:rPr lang="en-US" dirty="0"/>
-              <a:t>/</a:t>
-            </a:r>
+            <a:endParaRPr lang="en-US" dirty="0"/>
           </a:p>
           <a:p>
             <a:r>
               <a:rPr lang="en-US" sz="1400" i="1" dirty="0"/>
-              <a:t>Entity dashboard</a:t>
-            </a:r>
-          </a:p>
-          <a:p>
-            <a:r>
-              <a:rPr lang="en-US" sz="1400" i="1" dirty="0"/>
-              <a:t>Incorp Application filing</a:t>
-            </a:r>
-          </a:p>
-          <a:p>
-            <a:r>
-              <a:rPr lang="en-US" sz="1400" i="1" dirty="0"/>
-              <a:t>Annual Report filings</a:t>
-            </a:r>
-          </a:p>
-          <a:p>
-            <a:r>
-              <a:rPr lang="en-US" sz="1400" i="1" dirty="0"/>
-              <a:t>Change Of Addresses filings</a:t>
-            </a:r>
-          </a:p>
-          <a:p>
-            <a:r>
-              <a:rPr lang="en-US" sz="1400" i="1" dirty="0"/>
-              <a:t>Change Of Directors filings</a:t>
-            </a:r>
-          </a:p>
-          <a:p>
-            <a:r>
-              <a:rPr lang="en-US" sz="1400" i="1" dirty="0"/>
-              <a:t>AR/COA/COD corrections</a:t>
-            </a:r>
-          </a:p>
-        </p:txBody>
-      </p:sp>
-      <p:sp>
-        <p:nvSpPr>
-          <p:cNvPr id="6" name="TextBox 5">
-            <a:extLst>
-              <a:ext uri="{FF2B5EF4-FFF2-40B4-BE49-F238E27FC236}">
-                <a16:creationId xmlns:a16="http://schemas.microsoft.com/office/drawing/2014/main" id="{F30146CC-2A09-42F7-88C1-7DD004BF8F4A}"/>
+              <a:t>Step-based filings</a:t>
+            </a:r>
+          </a:p>
+        </p:txBody>
+      </p:sp>
+      <p:sp>
+        <p:nvSpPr>
+          <p:cNvPr id="5" name="TextBox 4">
+            <a:extLst>
+              <a:ext uri="{FF2B5EF4-FFF2-40B4-BE49-F238E27FC236}">
+                <a16:creationId xmlns:a16="http://schemas.microsoft.com/office/drawing/2014/main" id="{C3C93DF1-399E-457D-AFEF-704EEC9685EA}"/>
               </a:ext>
             </a:extLst>
           </p:cNvPr>
@@ -3547,8 +4985,8 @@
         </p:nvSpPr>
         <p:spPr>
           <a:xfrm>
-            <a:off x="1275213" y="4456896"/>
-            <a:ext cx="2438103" cy="584775"/>
+            <a:off x="2943949" y="3614312"/>
+            <a:ext cx="2584938" cy="1015663"/>
           </a:xfrm>
           <a:prstGeom prst="rect">
             <a:avLst/>
@@ -3581,25 +5019,34 @@
           <a:p>
             <a:r>
               <a:rPr lang="en-US" dirty="0" err="1"/>
-              <a:t>bcrs</a:t>
+              <a:t>bcgov</a:t>
             </a:r>
             <a:r>
               <a:rPr lang="en-US" dirty="0"/>
-              <a:t>-business-create-</a:t>
+              <a:t>/business-filings-</a:t>
             </a:r>
             <a:r>
               <a:rPr lang="en-US" dirty="0" err="1"/>
               <a:t>ui</a:t>
             </a:r>
-            <a:r>
-              <a:rPr lang="en-US" dirty="0"/>
-              <a:t>/</a:t>
-            </a:r>
+            <a:endParaRPr lang="en-US" dirty="0"/>
           </a:p>
           <a:p>
             <a:r>
               <a:rPr lang="en-US" sz="1400" i="1" dirty="0"/>
-              <a:t>Incorporation Application</a:t>
+              <a:t>Entity dashboard:</a:t>
+            </a:r>
+          </a:p>
+          <a:p>
+            <a:r>
+              <a:rPr lang="en-US" sz="1400" i="1" dirty="0"/>
+              <a:t>- business view</a:t>
+            </a:r>
+          </a:p>
+          <a:p>
+            <a:r>
+              <a:rPr lang="en-US" sz="1400" i="1" dirty="0"/>
+              <a:t>- launch point for filings</a:t>
             </a:r>
           </a:p>
         </p:txBody>
@@ -3618,8 +5065,8 @@
         </p:nvSpPr>
         <p:spPr>
           <a:xfrm>
-            <a:off x="4862699" y="4349173"/>
-            <a:ext cx="1760418" cy="800219"/>
+            <a:off x="8942733" y="4045200"/>
+            <a:ext cx="2312428" cy="584775"/>
           </a:xfrm>
           <a:prstGeom prst="rect">
             <a:avLst/>
@@ -3651,793 +5098,180 @@
           <a:lstStyle/>
           <a:p>
             <a:r>
+              <a:rPr lang="en-US" dirty="0" err="1"/>
+              <a:t>bcgov</a:t>
+            </a:r>
+            <a:r>
               <a:rPr lang="en-US" dirty="0"/>
-              <a:t>business-edit-</a:t>
+              <a:t>/business-edit-</a:t>
             </a:r>
             <a:r>
               <a:rPr lang="en-US" dirty="0" err="1"/>
               <a:t>ui</a:t>
             </a:r>
-            <a:r>
-              <a:rPr lang="en-US" dirty="0"/>
-              <a:t>/</a:t>
-            </a:r>
+            <a:endParaRPr lang="en-US" dirty="0"/>
           </a:p>
           <a:p>
             <a:r>
               <a:rPr lang="en-US" sz="1400" i="1" dirty="0"/>
-              <a:t>Correction – IA</a:t>
-            </a:r>
-          </a:p>
-          <a:p>
-            <a:r>
-              <a:rPr lang="en-US" sz="1400" i="1" dirty="0"/>
-              <a:t>Alteration</a:t>
-            </a:r>
-          </a:p>
-        </p:txBody>
-      </p:sp>
-      <p:sp>
-        <p:nvSpPr>
-          <p:cNvPr id="8" name="TextBox 7">
-            <a:extLst>
-              <a:ext uri="{FF2B5EF4-FFF2-40B4-BE49-F238E27FC236}">
-                <a16:creationId xmlns:a16="http://schemas.microsoft.com/office/drawing/2014/main" id="{D6CB8EDC-0E78-49DD-B92F-4DF7897A543F}"/>
-              </a:ext>
-            </a:extLst>
-          </p:cNvPr>
-          <p:cNvSpPr txBox="1"/>
+              <a:t>Single-page filings</a:t>
+            </a:r>
+          </a:p>
+        </p:txBody>
+      </p:sp>
+      <p:grpSp>
+        <p:nvGrpSpPr>
+          <p:cNvPr id="89" name="Group 88">
+            <a:extLst>
+              <a:ext uri="{FF2B5EF4-FFF2-40B4-BE49-F238E27FC236}">
+                <a16:creationId xmlns:a16="http://schemas.microsoft.com/office/drawing/2014/main" id="{FAE8454F-E618-EF21-6B43-50024EE5CB0E}"/>
+              </a:ext>
+            </a:extLst>
+          </p:cNvPr>
+          <p:cNvGrpSpPr/>
           <p:nvPr/>
-        </p:nvSpPr>
-        <p:spPr>
+        </p:nvGrpSpPr>
+        <p:grpSpPr>
           <a:xfrm>
-            <a:off x="6333679" y="799141"/>
-            <a:ext cx="1846275" cy="800219"/>
+            <a:off x="1178711" y="1824774"/>
+            <a:ext cx="2871549" cy="1231106"/>
+            <a:chOff x="1178711" y="1824774"/>
+            <a:chExt cx="2871549" cy="1231106"/>
           </a:xfrm>
-          <a:prstGeom prst="rect">
-            <a:avLst/>
-          </a:prstGeom>
-          <a:ln w="28575">
-            <a:solidFill>
-              <a:schemeClr val="accent6"/>
-            </a:solidFill>
-          </a:ln>
-        </p:spPr>
-        <p:style>
-          <a:lnRef idx="2">
-            <a:schemeClr val="dk1"/>
-          </a:lnRef>
-          <a:fillRef idx="1">
-            <a:schemeClr val="lt1"/>
-          </a:fillRef>
-          <a:effectRef idx="0">
-            <a:schemeClr val="dk1"/>
-          </a:effectRef>
-          <a:fontRef idx="minor">
-            <a:schemeClr val="dk1"/>
-          </a:fontRef>
-        </p:style>
-        <p:txBody>
-          <a:bodyPr wrap="none" rtlCol="0">
-            <a:spAutoFit/>
-          </a:bodyPr>
-          <a:lstStyle/>
-          <a:p>
-            <a:r>
-              <a:rPr lang="en-US" dirty="0" err="1"/>
-              <a:t>namerequest</a:t>
-            </a:r>
-            <a:r>
-              <a:rPr lang="en-US" dirty="0"/>
-              <a:t>/</a:t>
-            </a:r>
-          </a:p>
-          <a:p>
-            <a:r>
-              <a:rPr lang="en-US" sz="1400" i="1" dirty="0"/>
-              <a:t>New Name Search</a:t>
-            </a:r>
-          </a:p>
-          <a:p>
-            <a:r>
-              <a:rPr lang="en-US" sz="1400" i="1" dirty="0"/>
-              <a:t>Existing Name Request</a:t>
-            </a:r>
-          </a:p>
-        </p:txBody>
-      </p:sp>
-      <p:sp>
-        <p:nvSpPr>
-          <p:cNvPr id="35" name="TextBox 34">
-            <a:extLst>
-              <a:ext uri="{FF2B5EF4-FFF2-40B4-BE49-F238E27FC236}">
-                <a16:creationId xmlns:a16="http://schemas.microsoft.com/office/drawing/2014/main" id="{B801D31E-D8A3-4FBC-BFF0-69396C24B865}"/>
-              </a:ext>
-            </a:extLst>
-          </p:cNvPr>
-          <p:cNvSpPr txBox="1"/>
-          <p:nvPr/>
-        </p:nvSpPr>
-        <p:spPr>
-          <a:xfrm>
-            <a:off x="9123965" y="882665"/>
-            <a:ext cx="2073196" cy="584775"/>
-          </a:xfrm>
-          <a:prstGeom prst="rect">
-            <a:avLst/>
-          </a:prstGeom>
-          <a:ln w="28575">
-            <a:solidFill>
-              <a:srgbClr val="0070C0"/>
-            </a:solidFill>
-          </a:ln>
-        </p:spPr>
-        <p:style>
-          <a:lnRef idx="2">
-            <a:schemeClr val="dk1"/>
-          </a:lnRef>
-          <a:fillRef idx="1">
-            <a:schemeClr val="lt1"/>
-          </a:fillRef>
-          <a:effectRef idx="0">
-            <a:schemeClr val="dk1"/>
-          </a:effectRef>
-          <a:fontRef idx="minor">
-            <a:schemeClr val="dk1"/>
-          </a:fontRef>
-        </p:style>
-        <p:txBody>
-          <a:bodyPr wrap="none" rtlCol="0">
-            <a:spAutoFit/>
-          </a:bodyPr>
-          <a:lstStyle/>
-          <a:p>
-            <a:r>
-              <a:rPr lang="en-US" dirty="0" err="1"/>
-              <a:t>sbc</a:t>
-            </a:r>
-            <a:r>
-              <a:rPr lang="en-US" dirty="0"/>
-              <a:t>-auth/auth-web/</a:t>
-            </a:r>
-          </a:p>
-          <a:p>
-            <a:r>
-              <a:rPr lang="en-US" sz="1400" i="1" dirty="0"/>
-              <a:t>Pay pages</a:t>
-            </a:r>
-          </a:p>
-        </p:txBody>
-      </p:sp>
-      <p:cxnSp>
-        <p:nvCxnSpPr>
-          <p:cNvPr id="45" name="Straight Arrow Connector 44">
-            <a:extLst>
-              <a:ext uri="{FF2B5EF4-FFF2-40B4-BE49-F238E27FC236}">
-                <a16:creationId xmlns:a16="http://schemas.microsoft.com/office/drawing/2014/main" id="{B80FDF62-9404-4E76-8C6E-2C9DB2D29877}"/>
-              </a:ext>
-            </a:extLst>
-          </p:cNvPr>
-          <p:cNvCxnSpPr>
-            <a:cxnSpLocks/>
-            <a:stCxn id="4" idx="2"/>
-            <a:endCxn id="5" idx="0"/>
-          </p:cNvCxnSpPr>
-          <p:nvPr/>
-        </p:nvCxnSpPr>
-        <p:spPr>
-          <a:xfrm>
-            <a:off x="4172828" y="1707084"/>
-            <a:ext cx="0" cy="555524"/>
-          </a:xfrm>
-          <a:prstGeom prst="straightConnector1">
-            <a:avLst/>
-          </a:prstGeom>
-          <a:ln w="38100">
-            <a:solidFill>
-              <a:schemeClr val="tx1"/>
-            </a:solidFill>
-            <a:headEnd type="triangle"/>
-            <a:tailEnd type="triangle"/>
-          </a:ln>
-        </p:spPr>
-        <p:style>
-          <a:lnRef idx="1">
-            <a:schemeClr val="accent1"/>
-          </a:lnRef>
-          <a:fillRef idx="0">
-            <a:schemeClr val="accent1"/>
-          </a:fillRef>
-          <a:effectRef idx="0">
-            <a:schemeClr val="accent1"/>
-          </a:effectRef>
-          <a:fontRef idx="minor">
-            <a:schemeClr val="tx1"/>
-          </a:fontRef>
-        </p:style>
-      </p:cxnSp>
-      <p:cxnSp>
-        <p:nvCxnSpPr>
-          <p:cNvPr id="60" name="Straight Arrow Connector 59">
-            <a:extLst>
-              <a:ext uri="{FF2B5EF4-FFF2-40B4-BE49-F238E27FC236}">
-                <a16:creationId xmlns:a16="http://schemas.microsoft.com/office/drawing/2014/main" id="{81543814-CE31-45C0-9410-0A6DDB3EBA62}"/>
-              </a:ext>
-            </a:extLst>
-          </p:cNvPr>
-          <p:cNvCxnSpPr>
-            <a:cxnSpLocks/>
-            <a:stCxn id="6" idx="2"/>
-          </p:cNvCxnSpPr>
-          <p:nvPr/>
-        </p:nvCxnSpPr>
-        <p:spPr>
-          <a:xfrm>
-            <a:off x="2494265" y="5041671"/>
-            <a:ext cx="1219051" cy="540134"/>
-          </a:xfrm>
-          <a:prstGeom prst="straightConnector1">
-            <a:avLst/>
-          </a:prstGeom>
-          <a:ln w="38100">
-            <a:solidFill>
-              <a:schemeClr val="tx1"/>
-            </a:solidFill>
-            <a:tailEnd type="triangle"/>
-          </a:ln>
-        </p:spPr>
-        <p:style>
-          <a:lnRef idx="1">
-            <a:schemeClr val="accent1"/>
-          </a:lnRef>
-          <a:fillRef idx="0">
-            <a:schemeClr val="accent1"/>
-          </a:fillRef>
-          <a:effectRef idx="0">
-            <a:schemeClr val="accent1"/>
-          </a:effectRef>
-          <a:fontRef idx="minor">
-            <a:schemeClr val="tx1"/>
-          </a:fontRef>
-        </p:style>
-      </p:cxnSp>
-      <p:cxnSp>
-        <p:nvCxnSpPr>
-          <p:cNvPr id="62" name="Straight Arrow Connector 61">
-            <a:extLst>
-              <a:ext uri="{FF2B5EF4-FFF2-40B4-BE49-F238E27FC236}">
-                <a16:creationId xmlns:a16="http://schemas.microsoft.com/office/drawing/2014/main" id="{004765CE-E6F5-476D-845A-6DD19B11FCC0}"/>
-              </a:ext>
-            </a:extLst>
-          </p:cNvPr>
-          <p:cNvCxnSpPr>
-            <a:cxnSpLocks/>
-            <a:stCxn id="7" idx="2"/>
-          </p:cNvCxnSpPr>
-          <p:nvPr/>
-        </p:nvCxnSpPr>
-        <p:spPr>
-          <a:xfrm flipH="1">
-            <a:off x="4754880" y="5149392"/>
-            <a:ext cx="988028" cy="424572"/>
-          </a:xfrm>
-          <a:prstGeom prst="straightConnector1">
-            <a:avLst/>
-          </a:prstGeom>
-          <a:ln w="38100">
-            <a:solidFill>
-              <a:schemeClr val="tx1"/>
-            </a:solidFill>
-            <a:tailEnd type="triangle"/>
-          </a:ln>
-        </p:spPr>
-        <p:style>
-          <a:lnRef idx="1">
-            <a:schemeClr val="accent1"/>
-          </a:lnRef>
-          <a:fillRef idx="0">
-            <a:schemeClr val="accent1"/>
-          </a:fillRef>
-          <a:effectRef idx="0">
-            <a:schemeClr val="accent1"/>
-          </a:effectRef>
-          <a:fontRef idx="minor">
-            <a:schemeClr val="tx1"/>
-          </a:fontRef>
-        </p:style>
-      </p:cxnSp>
-      <p:cxnSp>
-        <p:nvCxnSpPr>
-          <p:cNvPr id="67" name="Straight Arrow Connector 66">
-            <a:extLst>
-              <a:ext uri="{FF2B5EF4-FFF2-40B4-BE49-F238E27FC236}">
-                <a16:creationId xmlns:a16="http://schemas.microsoft.com/office/drawing/2014/main" id="{AA12F04D-4BD8-4146-96AB-CAFE00202FB6}"/>
-              </a:ext>
-            </a:extLst>
-          </p:cNvPr>
-          <p:cNvCxnSpPr/>
-          <p:nvPr/>
-        </p:nvCxnSpPr>
-        <p:spPr>
-          <a:xfrm>
-            <a:off x="2011977" y="1199250"/>
-            <a:ext cx="944011" cy="0"/>
-          </a:xfrm>
-          <a:prstGeom prst="straightConnector1">
-            <a:avLst/>
-          </a:prstGeom>
-          <a:ln w="38100">
-            <a:solidFill>
-              <a:schemeClr val="tx1"/>
-            </a:solidFill>
-            <a:tailEnd type="triangle"/>
-          </a:ln>
-        </p:spPr>
-        <p:style>
-          <a:lnRef idx="1">
-            <a:schemeClr val="accent1"/>
-          </a:lnRef>
-          <a:fillRef idx="0">
-            <a:schemeClr val="accent1"/>
-          </a:fillRef>
-          <a:effectRef idx="0">
-            <a:schemeClr val="accent1"/>
-          </a:effectRef>
-          <a:fontRef idx="minor">
-            <a:schemeClr val="tx1"/>
-          </a:fontRef>
-        </p:style>
-      </p:cxnSp>
-      <p:cxnSp>
-        <p:nvCxnSpPr>
-          <p:cNvPr id="73" name="Straight Arrow Connector 72">
-            <a:extLst>
-              <a:ext uri="{FF2B5EF4-FFF2-40B4-BE49-F238E27FC236}">
-                <a16:creationId xmlns:a16="http://schemas.microsoft.com/office/drawing/2014/main" id="{699D0FFC-7D8F-4C2D-B81B-D956212BFFF1}"/>
-              </a:ext>
-            </a:extLst>
-          </p:cNvPr>
-          <p:cNvCxnSpPr>
-            <a:cxnSpLocks/>
-            <a:endCxn id="6" idx="0"/>
-          </p:cNvCxnSpPr>
-          <p:nvPr/>
-        </p:nvCxnSpPr>
-        <p:spPr>
-          <a:xfrm flipH="1">
-            <a:off x="2494265" y="3949063"/>
-            <a:ext cx="1219052" cy="507833"/>
-          </a:xfrm>
-          <a:prstGeom prst="straightConnector1">
-            <a:avLst/>
-          </a:prstGeom>
-          <a:ln w="38100">
-            <a:solidFill>
-              <a:schemeClr val="tx1"/>
-            </a:solidFill>
-            <a:tailEnd type="triangle"/>
-          </a:ln>
-        </p:spPr>
-        <p:style>
-          <a:lnRef idx="1">
-            <a:schemeClr val="accent1"/>
-          </a:lnRef>
-          <a:fillRef idx="0">
-            <a:schemeClr val="accent1"/>
-          </a:fillRef>
-          <a:effectRef idx="0">
-            <a:schemeClr val="accent1"/>
-          </a:effectRef>
-          <a:fontRef idx="minor">
-            <a:schemeClr val="tx1"/>
-          </a:fontRef>
-        </p:style>
-      </p:cxnSp>
-      <p:cxnSp>
-        <p:nvCxnSpPr>
-          <p:cNvPr id="75" name="Straight Arrow Connector 74">
-            <a:extLst>
-              <a:ext uri="{FF2B5EF4-FFF2-40B4-BE49-F238E27FC236}">
-                <a16:creationId xmlns:a16="http://schemas.microsoft.com/office/drawing/2014/main" id="{B391BAF9-C7EA-4896-8054-C1135ED73E33}"/>
-              </a:ext>
-            </a:extLst>
-          </p:cNvPr>
-          <p:cNvCxnSpPr>
-            <a:cxnSpLocks/>
-            <a:endCxn id="7" idx="0"/>
-          </p:cNvCxnSpPr>
-          <p:nvPr/>
-        </p:nvCxnSpPr>
-        <p:spPr>
-          <a:xfrm>
-            <a:off x="4754880" y="3924601"/>
-            <a:ext cx="988028" cy="424572"/>
-          </a:xfrm>
-          <a:prstGeom prst="straightConnector1">
-            <a:avLst/>
-          </a:prstGeom>
-          <a:ln w="38100">
-            <a:solidFill>
-              <a:schemeClr val="tx1"/>
-            </a:solidFill>
-            <a:tailEnd type="triangle"/>
-          </a:ln>
-        </p:spPr>
-        <p:style>
-          <a:lnRef idx="1">
-            <a:schemeClr val="accent1"/>
-          </a:lnRef>
-          <a:fillRef idx="0">
-            <a:schemeClr val="accent1"/>
-          </a:fillRef>
-          <a:effectRef idx="0">
-            <a:schemeClr val="accent1"/>
-          </a:effectRef>
-          <a:fontRef idx="minor">
-            <a:schemeClr val="tx1"/>
-          </a:fontRef>
-        </p:style>
-      </p:cxnSp>
-      <p:cxnSp>
-        <p:nvCxnSpPr>
-          <p:cNvPr id="77" name="Straight Arrow Connector 76">
-            <a:extLst>
-              <a:ext uri="{FF2B5EF4-FFF2-40B4-BE49-F238E27FC236}">
-                <a16:creationId xmlns:a16="http://schemas.microsoft.com/office/drawing/2014/main" id="{DC3ACAC7-989C-476A-A1B7-E395D7D15041}"/>
-              </a:ext>
-            </a:extLst>
-          </p:cNvPr>
-          <p:cNvCxnSpPr>
-            <a:cxnSpLocks/>
-            <a:stCxn id="22" idx="0"/>
-            <a:endCxn id="5" idx="2"/>
-          </p:cNvCxnSpPr>
-          <p:nvPr/>
-        </p:nvCxnSpPr>
-        <p:spPr>
-          <a:xfrm flipH="1" flipV="1">
-            <a:off x="4172828" y="3924601"/>
-            <a:ext cx="39468" cy="1657204"/>
-          </a:xfrm>
-          <a:prstGeom prst="straightConnector1">
-            <a:avLst/>
-          </a:prstGeom>
-          <a:ln w="38100">
-            <a:solidFill>
-              <a:schemeClr val="tx1"/>
-            </a:solidFill>
-            <a:tailEnd type="triangle"/>
-          </a:ln>
-        </p:spPr>
-        <p:style>
-          <a:lnRef idx="1">
-            <a:schemeClr val="accent1"/>
-          </a:lnRef>
-          <a:fillRef idx="0">
-            <a:schemeClr val="accent1"/>
-          </a:fillRef>
-          <a:effectRef idx="0">
-            <a:schemeClr val="accent1"/>
-          </a:effectRef>
-          <a:fontRef idx="minor">
-            <a:schemeClr val="tx1"/>
-          </a:fontRef>
-        </p:style>
-      </p:cxnSp>
-      <p:cxnSp>
-        <p:nvCxnSpPr>
-          <p:cNvPr id="78" name="Straight Arrow Connector 77">
-            <a:extLst>
-              <a:ext uri="{FF2B5EF4-FFF2-40B4-BE49-F238E27FC236}">
-                <a16:creationId xmlns:a16="http://schemas.microsoft.com/office/drawing/2014/main" id="{59B4E904-07DA-400D-92A1-1B3AB0EA14FF}"/>
-              </a:ext>
-            </a:extLst>
-          </p:cNvPr>
-          <p:cNvCxnSpPr/>
-          <p:nvPr/>
-        </p:nvCxnSpPr>
-        <p:spPr>
-          <a:xfrm>
-            <a:off x="5389668" y="1175053"/>
-            <a:ext cx="944011" cy="0"/>
-          </a:xfrm>
-          <a:prstGeom prst="straightConnector1">
-            <a:avLst/>
-          </a:prstGeom>
-          <a:ln w="38100">
-            <a:solidFill>
-              <a:schemeClr val="tx1"/>
-            </a:solidFill>
-            <a:tailEnd type="triangle"/>
-          </a:ln>
-        </p:spPr>
-        <p:style>
-          <a:lnRef idx="1">
-            <a:schemeClr val="accent1"/>
-          </a:lnRef>
-          <a:fillRef idx="0">
-            <a:schemeClr val="accent1"/>
-          </a:fillRef>
-          <a:effectRef idx="0">
-            <a:schemeClr val="accent1"/>
-          </a:effectRef>
-          <a:fontRef idx="minor">
-            <a:schemeClr val="tx1"/>
-          </a:fontRef>
-        </p:style>
-      </p:cxnSp>
-      <p:cxnSp>
-        <p:nvCxnSpPr>
-          <p:cNvPr id="79" name="Straight Arrow Connector 78">
-            <a:extLst>
-              <a:ext uri="{FF2B5EF4-FFF2-40B4-BE49-F238E27FC236}">
-                <a16:creationId xmlns:a16="http://schemas.microsoft.com/office/drawing/2014/main" id="{485D5494-9745-4402-9867-D501E64FC5EC}"/>
-              </a:ext>
-            </a:extLst>
-          </p:cNvPr>
-          <p:cNvCxnSpPr/>
-          <p:nvPr/>
-        </p:nvCxnSpPr>
-        <p:spPr>
-          <a:xfrm>
-            <a:off x="8179954" y="1058129"/>
-            <a:ext cx="944011" cy="0"/>
-          </a:xfrm>
-          <a:prstGeom prst="straightConnector1">
-            <a:avLst/>
-          </a:prstGeom>
-          <a:ln w="38100">
-            <a:solidFill>
-              <a:schemeClr val="tx1"/>
-            </a:solidFill>
-            <a:tailEnd type="triangle"/>
-          </a:ln>
-        </p:spPr>
-        <p:style>
-          <a:lnRef idx="1">
-            <a:schemeClr val="accent1"/>
-          </a:lnRef>
-          <a:fillRef idx="0">
-            <a:schemeClr val="accent1"/>
-          </a:fillRef>
-          <a:effectRef idx="0">
-            <a:schemeClr val="accent1"/>
-          </a:effectRef>
-          <a:fontRef idx="minor">
-            <a:schemeClr val="tx1"/>
-          </a:fontRef>
-        </p:style>
-      </p:cxnSp>
-      <p:cxnSp>
-        <p:nvCxnSpPr>
-          <p:cNvPr id="80" name="Straight Arrow Connector 79">
-            <a:extLst>
-              <a:ext uri="{FF2B5EF4-FFF2-40B4-BE49-F238E27FC236}">
-                <a16:creationId xmlns:a16="http://schemas.microsoft.com/office/drawing/2014/main" id="{1AA91446-CCDC-4AA2-AFEF-972FC8DF9A64}"/>
-              </a:ext>
-            </a:extLst>
-          </p:cNvPr>
-          <p:cNvCxnSpPr>
-            <a:cxnSpLocks/>
-          </p:cNvCxnSpPr>
-          <p:nvPr/>
-        </p:nvCxnSpPr>
-        <p:spPr>
-          <a:xfrm flipH="1">
-            <a:off x="8179954" y="1340371"/>
-            <a:ext cx="944011" cy="0"/>
-          </a:xfrm>
-          <a:prstGeom prst="straightConnector1">
-            <a:avLst/>
-          </a:prstGeom>
-          <a:ln w="38100">
-            <a:solidFill>
-              <a:schemeClr val="tx1"/>
-            </a:solidFill>
-            <a:tailEnd type="triangle"/>
-          </a:ln>
-        </p:spPr>
-        <p:style>
-          <a:lnRef idx="1">
-            <a:schemeClr val="accent1"/>
-          </a:lnRef>
-          <a:fillRef idx="0">
-            <a:schemeClr val="accent1"/>
-          </a:fillRef>
-          <a:effectRef idx="0">
-            <a:schemeClr val="accent1"/>
-          </a:effectRef>
-          <a:fontRef idx="minor">
-            <a:schemeClr val="tx1"/>
-          </a:fontRef>
-        </p:style>
-      </p:cxnSp>
-      <p:sp>
-        <p:nvSpPr>
-          <p:cNvPr id="19" name="TextBox 18">
-            <a:extLst>
-              <a:ext uri="{FF2B5EF4-FFF2-40B4-BE49-F238E27FC236}">
-                <a16:creationId xmlns:a16="http://schemas.microsoft.com/office/drawing/2014/main" id="{5AB0696E-555C-45CC-BDBB-F64197368427}"/>
-              </a:ext>
-            </a:extLst>
-          </p:cNvPr>
-          <p:cNvSpPr txBox="1"/>
-          <p:nvPr/>
-        </p:nvSpPr>
-        <p:spPr>
-          <a:xfrm>
-            <a:off x="9211296" y="5232469"/>
-            <a:ext cx="1436419" cy="369332"/>
-          </a:xfrm>
-          <a:prstGeom prst="rect">
-            <a:avLst/>
-          </a:prstGeom>
-          <a:ln w="28575">
-            <a:solidFill>
-              <a:schemeClr val="accent6"/>
-            </a:solidFill>
-          </a:ln>
-        </p:spPr>
-        <p:style>
-          <a:lnRef idx="2">
-            <a:schemeClr val="dk1"/>
-          </a:lnRef>
-          <a:fillRef idx="1">
-            <a:schemeClr val="lt1"/>
-          </a:fillRef>
-          <a:effectRef idx="0">
-            <a:schemeClr val="dk1"/>
-          </a:effectRef>
-          <a:fontRef idx="minor">
-            <a:schemeClr val="dk1"/>
-          </a:fontRef>
-        </p:style>
-        <p:txBody>
-          <a:bodyPr wrap="none" rtlCol="0">
-            <a:spAutoFit/>
-          </a:bodyPr>
-          <a:lstStyle/>
-          <a:p>
-            <a:r>
-              <a:rPr lang="en-US" dirty="0">
-                <a:solidFill>
-                  <a:schemeClr val="accent6"/>
-                </a:solidFill>
-              </a:rPr>
-              <a:t>Entities Team</a:t>
-            </a:r>
-            <a:endParaRPr lang="en-US" sz="1400" i="1" dirty="0">
+        </p:grpSpPr>
+        <p:sp>
+          <p:nvSpPr>
+            <p:cNvPr id="4" name="TextBox 3">
+              <a:extLst>
+                <a:ext uri="{FF2B5EF4-FFF2-40B4-BE49-F238E27FC236}">
+                  <a16:creationId xmlns:a16="http://schemas.microsoft.com/office/drawing/2014/main" id="{712D4233-AD5E-40F7-9BB0-7A49D1E0ABC7}"/>
+                </a:ext>
+              </a:extLst>
+            </p:cNvPr>
+            <p:cNvSpPr txBox="1"/>
+            <p:nvPr/>
+          </p:nvSpPr>
+          <p:spPr>
+            <a:xfrm>
+              <a:off x="1178711" y="1824774"/>
+              <a:ext cx="2383025" cy="1231106"/>
+            </a:xfrm>
+            <a:prstGeom prst="rect">
+              <a:avLst/>
+            </a:prstGeom>
+            <a:ln w="28575">
               <a:solidFill>
-                <a:schemeClr val="accent6"/>
+                <a:srgbClr val="0070C0"/>
               </a:solidFill>
-            </a:endParaRPr>
-          </a:p>
-        </p:txBody>
-      </p:sp>
-      <p:sp>
-        <p:nvSpPr>
-          <p:cNvPr id="20" name="TextBox 19">
-            <a:extLst>
-              <a:ext uri="{FF2B5EF4-FFF2-40B4-BE49-F238E27FC236}">
-                <a16:creationId xmlns:a16="http://schemas.microsoft.com/office/drawing/2014/main" id="{159BE1B8-7D43-4C9A-8AFC-959923351088}"/>
-              </a:ext>
-            </a:extLst>
-          </p:cNvPr>
-          <p:cNvSpPr txBox="1"/>
-          <p:nvPr/>
-        </p:nvSpPr>
-        <p:spPr>
-          <a:xfrm>
-            <a:off x="9211296" y="5797248"/>
-            <a:ext cx="1985865" cy="369332"/>
-          </a:xfrm>
-          <a:prstGeom prst="rect">
-            <a:avLst/>
-          </a:prstGeom>
-          <a:ln w="28575">
-            <a:solidFill>
-              <a:srgbClr val="0070C0"/>
-            </a:solidFill>
-          </a:ln>
-        </p:spPr>
-        <p:style>
-          <a:lnRef idx="2">
-            <a:schemeClr val="dk1"/>
-          </a:lnRef>
-          <a:fillRef idx="1">
-            <a:schemeClr val="lt1"/>
-          </a:fillRef>
-          <a:effectRef idx="0">
-            <a:schemeClr val="dk1"/>
-          </a:effectRef>
-          <a:fontRef idx="minor">
-            <a:schemeClr val="dk1"/>
-          </a:fontRef>
-        </p:style>
-        <p:txBody>
-          <a:bodyPr wrap="none" rtlCol="0">
-            <a:spAutoFit/>
-          </a:bodyPr>
-          <a:lstStyle/>
-          <a:p>
-            <a:r>
-              <a:rPr lang="en-US" dirty="0">
-                <a:solidFill>
-                  <a:schemeClr val="accent1"/>
-                </a:solidFill>
-              </a:rPr>
-              <a:t>Relationships Team</a:t>
-            </a:r>
-          </a:p>
-        </p:txBody>
-      </p:sp>
-      <p:sp>
-        <p:nvSpPr>
-          <p:cNvPr id="22" name="TextBox 21">
-            <a:extLst>
-              <a:ext uri="{FF2B5EF4-FFF2-40B4-BE49-F238E27FC236}">
-                <a16:creationId xmlns:a16="http://schemas.microsoft.com/office/drawing/2014/main" id="{EF69ABAB-BB88-4BCA-B31A-C7957D38B3F2}"/>
-              </a:ext>
-            </a:extLst>
-          </p:cNvPr>
-          <p:cNvSpPr txBox="1"/>
-          <p:nvPr/>
-        </p:nvSpPr>
-        <p:spPr>
-          <a:xfrm>
-            <a:off x="3175698" y="5581805"/>
-            <a:ext cx="2073196" cy="584775"/>
-          </a:xfrm>
-          <a:prstGeom prst="rect">
-            <a:avLst/>
-          </a:prstGeom>
-          <a:ln w="28575">
-            <a:solidFill>
-              <a:srgbClr val="0070C0"/>
-            </a:solidFill>
-          </a:ln>
-        </p:spPr>
-        <p:style>
-          <a:lnRef idx="2">
-            <a:schemeClr val="dk1"/>
-          </a:lnRef>
-          <a:fillRef idx="1">
-            <a:schemeClr val="lt1"/>
-          </a:fillRef>
-          <a:effectRef idx="0">
-            <a:schemeClr val="dk1"/>
-          </a:effectRef>
-          <a:fontRef idx="minor">
-            <a:schemeClr val="dk1"/>
-          </a:fontRef>
-        </p:style>
-        <p:txBody>
-          <a:bodyPr wrap="none" rtlCol="0">
-            <a:spAutoFit/>
-          </a:bodyPr>
-          <a:lstStyle/>
-          <a:p>
-            <a:r>
-              <a:rPr lang="en-US" dirty="0" err="1"/>
-              <a:t>sbc</a:t>
-            </a:r>
-            <a:r>
-              <a:rPr lang="en-US" dirty="0"/>
-              <a:t>-auth/auth-web/</a:t>
-            </a:r>
-          </a:p>
-          <a:p>
-            <a:r>
-              <a:rPr lang="en-US" sz="1400" i="1" dirty="0"/>
-              <a:t>Pay pages</a:t>
-            </a:r>
-          </a:p>
-        </p:txBody>
-      </p:sp>
+            </a:ln>
+          </p:spPr>
+          <p:style>
+            <a:lnRef idx="2">
+              <a:schemeClr val="dk1"/>
+            </a:lnRef>
+            <a:fillRef idx="1">
+              <a:schemeClr val="lt1"/>
+            </a:fillRef>
+            <a:effectRef idx="0">
+              <a:schemeClr val="dk1"/>
+            </a:effectRef>
+            <a:fontRef idx="minor">
+              <a:schemeClr val="dk1"/>
+            </a:fontRef>
+          </p:style>
+          <p:txBody>
+            <a:bodyPr wrap="none" rtlCol="0">
+              <a:spAutoFit/>
+            </a:bodyPr>
+            <a:lstStyle/>
+            <a:p>
+              <a:r>
+                <a:rPr lang="en-US" dirty="0" err="1"/>
+                <a:t>bcgov</a:t>
+              </a:r>
+              <a:r>
+                <a:rPr lang="en-US" dirty="0"/>
+                <a:t>/</a:t>
+              </a:r>
+              <a:r>
+                <a:rPr lang="en-US" dirty="0" err="1"/>
+                <a:t>sbc</a:t>
+              </a:r>
+              <a:r>
+                <a:rPr lang="en-US" dirty="0"/>
+                <a:t>-auth</a:t>
+              </a:r>
+            </a:p>
+            <a:p>
+              <a:r>
+                <a:rPr lang="en-US" sz="1400" i="1" dirty="0"/>
+                <a:t>Auth API + Auth Web UI:</a:t>
+              </a:r>
+            </a:p>
+            <a:p>
+              <a:r>
+                <a:rPr lang="en-US" sz="1400" i="1" dirty="0"/>
+                <a:t>- Business Registry home page</a:t>
+              </a:r>
+            </a:p>
+            <a:p>
+              <a:r>
+                <a:rPr lang="en-US" sz="1400" i="1" dirty="0"/>
+                <a:t>- My Business Registry</a:t>
+              </a:r>
+            </a:p>
+            <a:p>
+              <a:r>
+                <a:rPr lang="en-US" sz="1400" i="1" dirty="0"/>
+                <a:t>- User/account management</a:t>
+              </a:r>
+            </a:p>
+          </p:txBody>
+        </p:sp>
+        <p:pic>
+          <p:nvPicPr>
+            <p:cNvPr id="85" name="Graphic 84" descr="Database outline">
+              <a:extLst>
+                <a:ext uri="{FF2B5EF4-FFF2-40B4-BE49-F238E27FC236}">
+                  <a16:creationId xmlns:a16="http://schemas.microsoft.com/office/drawing/2014/main" id="{95411D44-0090-000F-5D3C-AA5E767E5086}"/>
+                </a:ext>
+              </a:extLst>
+            </p:cNvPr>
+            <p:cNvPicPr>
+              <a:picLocks noChangeAspect="1"/>
+            </p:cNvPicPr>
+            <p:nvPr/>
+          </p:nvPicPr>
+          <p:blipFill>
+            <a:blip r:embed="rId2">
+              <a:extLst>
+                <a:ext uri="{28A0092B-C50C-407E-A947-70E740481C1C}">
+                  <a14:useLocalDpi xmlns:a14="http://schemas.microsoft.com/office/drawing/2010/main" val="0"/>
+                </a:ext>
+                <a:ext uri="{96DAC541-7B7A-43D3-8B79-37D633B846F1}">
+                  <asvg:svgBlip xmlns:asvg="http://schemas.microsoft.com/office/drawing/2016/SVG/main" r:embed="rId3"/>
+                </a:ext>
+              </a:extLst>
+            </a:blip>
+            <a:stretch>
+              <a:fillRect/>
+            </a:stretch>
+          </p:blipFill>
+          <p:spPr>
+            <a:xfrm>
+              <a:off x="3498349" y="2160110"/>
+              <a:ext cx="551911" cy="551911"/>
+            </a:xfrm>
+            <a:prstGeom prst="rect">
+              <a:avLst/>
+            </a:prstGeom>
+          </p:spPr>
+        </p:pic>
+      </p:grpSp>
     </p:spTree>
     <p:extLst>
       <p:ext uri="{BB962C8B-B14F-4D97-AF65-F5344CB8AC3E}">
-        <p14:creationId xmlns:p14="http://schemas.microsoft.com/office/powerpoint/2010/main" val="3493864981"/>
+        <p14:creationId xmlns:p14="http://schemas.microsoft.com/office/powerpoint/2010/main" val="1314632903"/>
       </p:ext>
     </p:extLst>
   </p:cSld>

</xml_diff>

<commit_message>
- added Business API diagram
</commit_message>
<xml_diff>
--- a/docs/diagrams/source/app hierarchy.pptx
+++ b/docs/diagrams/source/app hierarchy.pptx
@@ -200,7 +200,7 @@
           <a:p>
             <a:fld id="{C4C3B15E-0FC9-426C-9992-B1604D3D55A7}" type="datetimeFigureOut">
               <a:rPr lang="en-CA" smtClean="0"/>
-              <a:t>2025-10-22</a:t>
+              <a:t>2025-10-24</a:t>
             </a:fld>
             <a:endParaRPr lang="en-CA"/>
           </a:p>
@@ -699,7 +699,7 @@
           <a:p>
             <a:fld id="{9218C037-0CDA-4AFF-9401-E8C27D0BCF5A}" type="datetimeFigureOut">
               <a:rPr lang="en-US" smtClean="0"/>
-              <a:t>10/22/2025</a:t>
+              <a:t>10/24/2025</a:t>
             </a:fld>
             <a:endParaRPr lang="en-US"/>
           </a:p>
@@ -897,7 +897,7 @@
           <a:p>
             <a:fld id="{9218C037-0CDA-4AFF-9401-E8C27D0BCF5A}" type="datetimeFigureOut">
               <a:rPr lang="en-US" smtClean="0"/>
-              <a:t>10/22/2025</a:t>
+              <a:t>10/24/2025</a:t>
             </a:fld>
             <a:endParaRPr lang="en-US"/>
           </a:p>
@@ -1105,7 +1105,7 @@
           <a:p>
             <a:fld id="{9218C037-0CDA-4AFF-9401-E8C27D0BCF5A}" type="datetimeFigureOut">
               <a:rPr lang="en-US" smtClean="0"/>
-              <a:t>10/22/2025</a:t>
+              <a:t>10/24/2025</a:t>
             </a:fld>
             <a:endParaRPr lang="en-US"/>
           </a:p>
@@ -1303,7 +1303,7 @@
           <a:p>
             <a:fld id="{9218C037-0CDA-4AFF-9401-E8C27D0BCF5A}" type="datetimeFigureOut">
               <a:rPr lang="en-US" smtClean="0"/>
-              <a:t>10/22/2025</a:t>
+              <a:t>10/24/2025</a:t>
             </a:fld>
             <a:endParaRPr lang="en-US"/>
           </a:p>
@@ -1578,7 +1578,7 @@
           <a:p>
             <a:fld id="{9218C037-0CDA-4AFF-9401-E8C27D0BCF5A}" type="datetimeFigureOut">
               <a:rPr lang="en-US" smtClean="0"/>
-              <a:t>10/22/2025</a:t>
+              <a:t>10/24/2025</a:t>
             </a:fld>
             <a:endParaRPr lang="en-US"/>
           </a:p>
@@ -1843,7 +1843,7 @@
           <a:p>
             <a:fld id="{9218C037-0CDA-4AFF-9401-E8C27D0BCF5A}" type="datetimeFigureOut">
               <a:rPr lang="en-US" smtClean="0"/>
-              <a:t>10/22/2025</a:t>
+              <a:t>10/24/2025</a:t>
             </a:fld>
             <a:endParaRPr lang="en-US"/>
           </a:p>
@@ -2255,7 +2255,7 @@
           <a:p>
             <a:fld id="{9218C037-0CDA-4AFF-9401-E8C27D0BCF5A}" type="datetimeFigureOut">
               <a:rPr lang="en-US" smtClean="0"/>
-              <a:t>10/22/2025</a:t>
+              <a:t>10/24/2025</a:t>
             </a:fld>
             <a:endParaRPr lang="en-US"/>
           </a:p>
@@ -2396,7 +2396,7 @@
           <a:p>
             <a:fld id="{9218C037-0CDA-4AFF-9401-E8C27D0BCF5A}" type="datetimeFigureOut">
               <a:rPr lang="en-US" smtClean="0"/>
-              <a:t>10/22/2025</a:t>
+              <a:t>10/24/2025</a:t>
             </a:fld>
             <a:endParaRPr lang="en-US"/>
           </a:p>
@@ -2509,7 +2509,7 @@
           <a:p>
             <a:fld id="{9218C037-0CDA-4AFF-9401-E8C27D0BCF5A}" type="datetimeFigureOut">
               <a:rPr lang="en-US" smtClean="0"/>
-              <a:t>10/22/2025</a:t>
+              <a:t>10/24/2025</a:t>
             </a:fld>
             <a:endParaRPr lang="en-US"/>
           </a:p>
@@ -2820,7 +2820,7 @@
           <a:p>
             <a:fld id="{9218C037-0CDA-4AFF-9401-E8C27D0BCF5A}" type="datetimeFigureOut">
               <a:rPr lang="en-US" smtClean="0"/>
-              <a:t>10/22/2025</a:t>
+              <a:t>10/24/2025</a:t>
             </a:fld>
             <a:endParaRPr lang="en-US"/>
           </a:p>
@@ -3108,7 +3108,7 @@
           <a:p>
             <a:fld id="{9218C037-0CDA-4AFF-9401-E8C27D0BCF5A}" type="datetimeFigureOut">
               <a:rPr lang="en-US" smtClean="0"/>
-              <a:t>10/22/2025</a:t>
+              <a:t>10/24/2025</a:t>
             </a:fld>
             <a:endParaRPr lang="en-US"/>
           </a:p>
@@ -3349,7 +3349,7 @@
           <a:p>
             <a:fld id="{9218C037-0CDA-4AFF-9401-E8C27D0BCF5A}" type="datetimeFigureOut">
               <a:rPr lang="en-US" smtClean="0"/>
-              <a:t>10/22/2025</a:t>
+              <a:t>10/24/2025</a:t>
             </a:fld>
             <a:endParaRPr lang="en-US"/>
           </a:p>
@@ -3851,14 +3851,14 @@
           <a:lstStyle/>
           <a:p>
             <a:r>
-              <a:rPr lang="en-US" sz="1000" dirty="0" err="1">
+              <a:rPr lang="en-US" sz="1000" b="1" dirty="0" err="1">
                 <a:solidFill>
                   <a:schemeClr val="tx1"/>
                 </a:solidFill>
               </a:rPr>
               <a:t>bcregistry</a:t>
             </a:r>
-            <a:endParaRPr lang="en-US" sz="1000" dirty="0">
+            <a:endParaRPr lang="en-US" sz="1000" b="1" dirty="0">
               <a:solidFill>
                 <a:schemeClr val="tx1"/>
               </a:solidFill>
@@ -3878,10 +3878,10 @@
       </p:sp>
       <p:grpSp>
         <p:nvGrpSpPr>
-          <p:cNvPr id="450" name="Group 449">
-            <a:extLst>
-              <a:ext uri="{FF2B5EF4-FFF2-40B4-BE49-F238E27FC236}">
-                <a16:creationId xmlns:a16="http://schemas.microsoft.com/office/drawing/2014/main" id="{FFE99932-39B7-FBDA-A8B9-9ABF6F6A2AED}"/>
+          <p:cNvPr id="34" name="Group 33">
+            <a:extLst>
+              <a:ext uri="{FF2B5EF4-FFF2-40B4-BE49-F238E27FC236}">
+                <a16:creationId xmlns:a16="http://schemas.microsoft.com/office/drawing/2014/main" id="{80C5D8CD-7310-7A18-6448-87EF9ABAF678}"/>
               </a:ext>
             </a:extLst>
           </p:cNvPr>
@@ -3890,10 +3890,10 @@
         </p:nvGrpSpPr>
         <p:grpSpPr>
           <a:xfrm>
-            <a:off x="6187381" y="3453070"/>
-            <a:ext cx="1736447" cy="553998"/>
-            <a:chOff x="6187381" y="3453070"/>
-            <a:chExt cx="1736447" cy="553998"/>
+            <a:off x="6187381" y="3291145"/>
+            <a:ext cx="1781159" cy="861774"/>
+            <a:chOff x="6187381" y="3291145"/>
+            <a:chExt cx="1781159" cy="861774"/>
           </a:xfrm>
         </p:grpSpPr>
         <p:sp>
@@ -3910,8 +3910,8 @@
           </p:nvSpPr>
           <p:spPr>
             <a:xfrm>
-              <a:off x="6187381" y="3453070"/>
-              <a:ext cx="1075936" cy="553998"/>
+              <a:off x="6187381" y="3291145"/>
+              <a:ext cx="1104790" cy="861774"/>
             </a:xfrm>
             <a:prstGeom prst="rect">
               <a:avLst/>
@@ -3943,27 +3943,12 @@
             <a:lstStyle/>
             <a:p>
               <a:r>
-                <a:rPr lang="en-US" sz="1000" b="1" dirty="0" err="1">
+                <a:rPr lang="en-US" sz="1000" b="1" dirty="0">
                   <a:solidFill>
                     <a:schemeClr val="tx1"/>
                   </a:solidFill>
                 </a:rPr>
-                <a:t>lear</a:t>
-              </a:r>
-              <a:endParaRPr lang="en-US" sz="1000" b="1" dirty="0">
-                <a:solidFill>
-                  <a:schemeClr val="tx1"/>
-                </a:solidFill>
-              </a:endParaRPr>
-            </a:p>
-            <a:p>
-              <a:r>
-                <a:rPr lang="en-US" sz="1000" i="1" dirty="0">
-                  <a:solidFill>
-                    <a:schemeClr val="tx1"/>
-                  </a:solidFill>
-                </a:rPr>
-                <a:t>- Business API,</a:t>
+                <a:t>Business Registry</a:t>
               </a:r>
             </a:p>
             <a:p>
@@ -3973,8 +3958,30 @@
                     <a:schemeClr val="tx1"/>
                   </a:solidFill>
                 </a:rPr>
-                <a:t>Emailer, Filer, </a:t>
+                <a:t>Business API,</a:t>
               </a:r>
+            </a:p>
+            <a:p>
+              <a:r>
+                <a:rPr lang="en-US" sz="1000" i="1" dirty="0">
+                  <a:solidFill>
+                    <a:schemeClr val="tx1"/>
+                  </a:solidFill>
+                </a:rPr>
+                <a:t>Emailer, Filer,</a:t>
+              </a:r>
+            </a:p>
+            <a:p>
+              <a:r>
+                <a:rPr lang="en-US" sz="1000" i="1" dirty="0">
+                  <a:solidFill>
+                    <a:schemeClr val="tx1"/>
+                  </a:solidFill>
+                </a:rPr>
+                <a:t>COLIN sync, jobs,</a:t>
+              </a:r>
+            </a:p>
+            <a:p>
               <a:r>
                 <a:rPr lang="en-US" sz="1000" i="1" dirty="0" err="1">
                   <a:solidFill>
@@ -4022,7 +4029,7 @@
           </p:blipFill>
           <p:spPr>
             <a:xfrm>
-              <a:off x="7371917" y="3453070"/>
+              <a:off x="7416629" y="3291145"/>
               <a:ext cx="551911" cy="551911"/>
             </a:xfrm>
             <a:prstGeom prst="rect">
@@ -4048,8 +4055,8 @@
           </p:nvCxnSpPr>
           <p:spPr>
             <a:xfrm flipV="1">
-              <a:off x="7263317" y="3729026"/>
-              <a:ext cx="108600" cy="1043"/>
+              <a:off x="7292171" y="3567101"/>
+              <a:ext cx="124458" cy="154931"/>
             </a:xfrm>
             <a:prstGeom prst="line">
               <a:avLst/>
@@ -4401,9 +4408,9 @@
             <p:nvPr/>
           </p:nvCxnSpPr>
           <p:spPr>
-            <a:xfrm>
-              <a:off x="4992888" y="3725308"/>
-              <a:ext cx="1194493" cy="4761"/>
+            <a:xfrm flipV="1">
+              <a:off x="4992888" y="3722032"/>
+              <a:ext cx="1194493" cy="3276"/>
             </a:xfrm>
             <a:prstGeom prst="straightConnector1">
               <a:avLst/>
@@ -4585,12 +4592,12 @@
           </p:nvCxnSpPr>
           <p:spPr>
             <a:xfrm flipV="1">
-              <a:off x="4584027" y="3730069"/>
-              <a:ext cx="1603354" cy="1838650"/>
+              <a:off x="4584027" y="3722032"/>
+              <a:ext cx="1603354" cy="1846687"/>
             </a:xfrm>
             <a:prstGeom prst="bentConnector3">
               <a:avLst>
-                <a:gd name="adj1" fmla="val 67109"/>
+                <a:gd name="adj1" fmla="val 67030"/>
               </a:avLst>
             </a:prstGeom>
             <a:ln w="38100">
@@ -4807,12 +4814,12 @@
           </p:nvCxnSpPr>
           <p:spPr>
             <a:xfrm flipV="1">
-              <a:off x="5217229" y="3730069"/>
-              <a:ext cx="970152" cy="633425"/>
+              <a:off x="5217229" y="3722032"/>
+              <a:ext cx="970152" cy="641462"/>
             </a:xfrm>
             <a:prstGeom prst="bentConnector3">
               <a:avLst>
-                <a:gd name="adj1" fmla="val 46073"/>
+                <a:gd name="adj1" fmla="val 45091"/>
               </a:avLst>
             </a:prstGeom>
             <a:ln w="38100">
@@ -5213,8 +5220,8 @@
         </p:nvCxnSpPr>
         <p:spPr>
           <a:xfrm>
-            <a:off x="1996543" y="2357481"/>
-            <a:ext cx="3204" cy="346574"/>
+            <a:off x="1996543" y="2366929"/>
+            <a:ext cx="3204" cy="337126"/>
           </a:xfrm>
           <a:prstGeom prst="straightConnector1">
             <a:avLst/>
@@ -5264,7 +5271,7 @@
           </a:xfrm>
           <a:prstGeom prst="bentConnector3">
             <a:avLst>
-              <a:gd name="adj1" fmla="val 84268"/>
+              <a:gd name="adj1" fmla="val 84126"/>
             </a:avLst>
           </a:prstGeom>
           <a:ln w="38100">
@@ -5303,10 +5310,10 @@
         </p:nvGrpSpPr>
         <p:grpSpPr>
           <a:xfrm>
-            <a:off x="6096001" y="1111268"/>
-            <a:ext cx="2093634" cy="1087046"/>
-            <a:chOff x="6096001" y="1106505"/>
-            <a:chExt cx="2093634" cy="1087046"/>
+            <a:off x="6096002" y="1106504"/>
+            <a:ext cx="2093633" cy="1091810"/>
+            <a:chOff x="6096002" y="1101741"/>
+            <a:chExt cx="2093633" cy="1091810"/>
           </a:xfrm>
         </p:grpSpPr>
         <p:sp>
@@ -5386,6 +5393,7 @@
               </a:extLst>
             </p:cNvPr>
             <p:cNvCxnSpPr>
+              <a:cxnSpLocks/>
               <a:stCxn id="11" idx="2"/>
               <a:endCxn id="35" idx="0"/>
             </p:cNvCxnSpPr>
@@ -5393,284 +5401,13 @@
           </p:nvCxnSpPr>
           <p:spPr>
             <a:xfrm rot="16200000" flipH="1">
-              <a:off x="6642977" y="559529"/>
-              <a:ext cx="686936" cy="1780888"/>
+              <a:off x="6640596" y="557147"/>
+              <a:ext cx="691699" cy="1780888"/>
             </a:xfrm>
             <a:prstGeom prst="bentConnector3">
-              <a:avLst/>
-            </a:prstGeom>
-            <a:ln w="38100">
-              <a:solidFill>
-                <a:schemeClr val="accent1"/>
-              </a:solidFill>
-              <a:prstDash val="sysDot"/>
-              <a:tailEnd type="triangle"/>
-            </a:ln>
-          </p:spPr>
-          <p:style>
-            <a:lnRef idx="1">
-              <a:schemeClr val="accent1"/>
-            </a:lnRef>
-            <a:fillRef idx="0">
-              <a:schemeClr val="accent1"/>
-            </a:fillRef>
-            <a:effectRef idx="0">
-              <a:schemeClr val="accent1"/>
-            </a:effectRef>
-            <a:fontRef idx="minor">
-              <a:schemeClr val="tx1"/>
-            </a:fontRef>
-          </p:style>
-        </p:cxnSp>
-      </p:grpSp>
-      <p:grpSp>
-        <p:nvGrpSpPr>
-          <p:cNvPr id="319" name="Group 318">
-            <a:extLst>
-              <a:ext uri="{FF2B5EF4-FFF2-40B4-BE49-F238E27FC236}">
-                <a16:creationId xmlns:a16="http://schemas.microsoft.com/office/drawing/2014/main" id="{93B7FD4E-D5BF-2E95-90FA-FE547C5790BF}"/>
-              </a:ext>
-            </a:extLst>
-          </p:cNvPr>
-          <p:cNvGrpSpPr/>
-          <p:nvPr/>
-        </p:nvGrpSpPr>
-        <p:grpSpPr>
-          <a:xfrm>
-            <a:off x="6096000" y="1114125"/>
-            <a:ext cx="3654416" cy="1243356"/>
-            <a:chOff x="6096000" y="1106505"/>
-            <a:chExt cx="3654416" cy="1243356"/>
-          </a:xfrm>
-        </p:grpSpPr>
-        <p:sp>
-          <p:nvSpPr>
-            <p:cNvPr id="36" name="TextBox 35">
-              <a:extLst>
-                <a:ext uri="{FF2B5EF4-FFF2-40B4-BE49-F238E27FC236}">
-                  <a16:creationId xmlns:a16="http://schemas.microsoft.com/office/drawing/2014/main" id="{2FB566BC-A1A2-454E-FBE4-CFBD6E509627}"/>
-                </a:ext>
-              </a:extLst>
-            </p:cNvPr>
-            <p:cNvSpPr txBox="1"/>
-            <p:nvPr/>
-          </p:nvSpPr>
-          <p:spPr>
-            <a:xfrm>
-              <a:off x="9120115" y="1795863"/>
-              <a:ext cx="630301" cy="553998"/>
-            </a:xfrm>
-            <a:prstGeom prst="rect">
-              <a:avLst/>
-            </a:prstGeom>
-            <a:ln w="28575">
-              <a:solidFill>
-                <a:schemeClr val="tx1"/>
-              </a:solidFill>
-            </a:ln>
-          </p:spPr>
-          <p:style>
-            <a:lnRef idx="2">
-              <a:schemeClr val="dk1"/>
-            </a:lnRef>
-            <a:fillRef idx="1">
-              <a:schemeClr val="lt1"/>
-            </a:fillRef>
-            <a:effectRef idx="0">
-              <a:schemeClr val="dk1"/>
-            </a:effectRef>
-            <a:fontRef idx="minor">
-              <a:schemeClr val="dk1"/>
-            </a:fontRef>
-          </p:style>
-          <p:txBody>
-            <a:bodyPr wrap="none" rtlCol="0">
-              <a:spAutoFit/>
-            </a:bodyPr>
-            <a:lstStyle/>
-            <a:p>
-              <a:r>
-                <a:rPr lang="en-US" sz="1000" i="1" dirty="0">
-                  <a:solidFill>
-                    <a:schemeClr val="tx1"/>
-                  </a:solidFill>
-                </a:rPr>
-                <a:t>Personal</a:t>
-              </a:r>
-            </a:p>
-            <a:p>
-              <a:r>
-                <a:rPr lang="en-US" sz="1000" i="1" dirty="0">
-                  <a:solidFill>
-                    <a:schemeClr val="tx1"/>
-                  </a:solidFill>
-                </a:rPr>
-                <a:t>Property</a:t>
-              </a:r>
-            </a:p>
-            <a:p>
-              <a:r>
-                <a:rPr lang="en-US" sz="1000" i="1" dirty="0">
-                  <a:solidFill>
-                    <a:schemeClr val="tx1"/>
-                  </a:solidFill>
-                </a:rPr>
-                <a:t>Registry</a:t>
-              </a:r>
-            </a:p>
-          </p:txBody>
-        </p:sp>
-        <p:cxnSp>
-          <p:nvCxnSpPr>
-            <p:cNvPr id="317" name="Connector: Elbow 316">
-              <a:extLst>
-                <a:ext uri="{FF2B5EF4-FFF2-40B4-BE49-F238E27FC236}">
-                  <a16:creationId xmlns:a16="http://schemas.microsoft.com/office/drawing/2014/main" id="{2E89508E-D8CF-9A55-C393-48C5D3EFCC90}"/>
-                </a:ext>
-              </a:extLst>
-            </p:cNvPr>
-            <p:cNvCxnSpPr>
-              <a:stCxn id="11" idx="2"/>
-              <a:endCxn id="36" idx="0"/>
-            </p:cNvCxnSpPr>
-            <p:nvPr/>
-          </p:nvCxnSpPr>
-          <p:spPr>
-            <a:xfrm rot="16200000" flipH="1">
-              <a:off x="7420954" y="-218449"/>
-              <a:ext cx="689358" cy="3339265"/>
-            </a:xfrm>
-            <a:prstGeom prst="bentConnector3">
-              <a:avLst/>
-            </a:prstGeom>
-            <a:ln w="38100">
-              <a:solidFill>
-                <a:schemeClr val="accent1"/>
-              </a:solidFill>
-              <a:prstDash val="sysDot"/>
-              <a:tailEnd type="triangle"/>
-            </a:ln>
-          </p:spPr>
-          <p:style>
-            <a:lnRef idx="1">
-              <a:schemeClr val="accent1"/>
-            </a:lnRef>
-            <a:fillRef idx="0">
-              <a:schemeClr val="accent1"/>
-            </a:fillRef>
-            <a:effectRef idx="0">
-              <a:schemeClr val="accent1"/>
-            </a:effectRef>
-            <a:fontRef idx="minor">
-              <a:schemeClr val="tx1"/>
-            </a:fontRef>
-          </p:style>
-        </p:cxnSp>
-      </p:grpSp>
-      <p:grpSp>
-        <p:nvGrpSpPr>
-          <p:cNvPr id="323" name="Group 322">
-            <a:extLst>
-              <a:ext uri="{FF2B5EF4-FFF2-40B4-BE49-F238E27FC236}">
-                <a16:creationId xmlns:a16="http://schemas.microsoft.com/office/drawing/2014/main" id="{5784947D-46C5-FFF9-EBB8-274EF79035CF}"/>
-              </a:ext>
-            </a:extLst>
-          </p:cNvPr>
-          <p:cNvGrpSpPr/>
-          <p:nvPr/>
-        </p:nvGrpSpPr>
-        <p:grpSpPr>
-          <a:xfrm>
-            <a:off x="6096002" y="1101741"/>
-            <a:ext cx="4806753" cy="951949"/>
-            <a:chOff x="6096002" y="1106504"/>
-            <a:chExt cx="4806753" cy="951949"/>
-          </a:xfrm>
-        </p:grpSpPr>
-        <p:sp>
-          <p:nvSpPr>
-            <p:cNvPr id="37" name="TextBox 36">
-              <a:extLst>
-                <a:ext uri="{FF2B5EF4-FFF2-40B4-BE49-F238E27FC236}">
-                  <a16:creationId xmlns:a16="http://schemas.microsoft.com/office/drawing/2014/main" id="{BAB1F037-73C9-ECB5-AD09-CCD1353EE10B}"/>
-                </a:ext>
-              </a:extLst>
-            </p:cNvPr>
-            <p:cNvSpPr txBox="1"/>
-            <p:nvPr/>
-          </p:nvSpPr>
-          <p:spPr>
-            <a:xfrm>
-              <a:off x="10559391" y="1812232"/>
-              <a:ext cx="343364" cy="246221"/>
-            </a:xfrm>
-            <a:prstGeom prst="rect">
-              <a:avLst/>
-            </a:prstGeom>
-            <a:ln w="28575">
-              <a:solidFill>
-                <a:schemeClr val="tx1"/>
-              </a:solidFill>
-            </a:ln>
-          </p:spPr>
-          <p:style>
-            <a:lnRef idx="2">
-              <a:schemeClr val="dk1"/>
-            </a:lnRef>
-            <a:fillRef idx="1">
-              <a:schemeClr val="lt1"/>
-            </a:fillRef>
-            <a:effectRef idx="0">
-              <a:schemeClr val="dk1"/>
-            </a:effectRef>
-            <a:fontRef idx="minor">
-              <a:schemeClr val="dk1"/>
-            </a:fontRef>
-          </p:style>
-          <p:txBody>
-            <a:bodyPr wrap="none" rtlCol="0">
-              <a:spAutoFit/>
-            </a:bodyPr>
-            <a:lstStyle/>
-            <a:p>
-              <a:r>
-                <a:rPr lang="en-US" sz="1000" i="1" dirty="0" err="1">
-                  <a:solidFill>
-                    <a:schemeClr val="tx1"/>
-                  </a:solidFill>
-                </a:rPr>
-                <a:t>Etc</a:t>
-              </a:r>
-              <a:endParaRPr lang="en-US" sz="1000" i="1" dirty="0">
-                <a:solidFill>
-                  <a:schemeClr val="tx1"/>
-                </a:solidFill>
-              </a:endParaRPr>
-            </a:p>
-          </p:txBody>
-        </p:sp>
-        <p:cxnSp>
-          <p:nvCxnSpPr>
-            <p:cNvPr id="321" name="Connector: Elbow 320">
-              <a:extLst>
-                <a:ext uri="{FF2B5EF4-FFF2-40B4-BE49-F238E27FC236}">
-                  <a16:creationId xmlns:a16="http://schemas.microsoft.com/office/drawing/2014/main" id="{4F677066-B1FB-18B5-6048-B596D8C09127}"/>
-                </a:ext>
-              </a:extLst>
-            </p:cNvPr>
-            <p:cNvCxnSpPr>
-              <a:stCxn id="11" idx="2"/>
-              <a:endCxn id="37" idx="0"/>
-            </p:cNvCxnSpPr>
-            <p:nvPr/>
-          </p:nvCxnSpPr>
-          <p:spPr>
-            <a:xfrm rot="16200000" flipH="1">
-              <a:off x="8060674" y="-858168"/>
-              <a:ext cx="705727" cy="4635072"/>
-            </a:xfrm>
-            <a:prstGeom prst="bentConnector3">
-              <a:avLst/>
+              <a:avLst>
+                <a:gd name="adj1" fmla="val 50000"/>
+              </a:avLst>
             </a:prstGeom>
             <a:ln w="38100">
               <a:solidFill>
@@ -5844,7 +5581,7 @@
         </p:blipFill>
         <p:spPr>
           <a:xfrm>
-            <a:off x="6129942" y="1798464"/>
+            <a:off x="6133476" y="1798464"/>
             <a:ext cx="551911" cy="551911"/>
           </a:xfrm>
           <a:prstGeom prst="rect">
@@ -5870,11 +5607,13 @@
         </p:nvCxnSpPr>
         <p:spPr>
           <a:xfrm rot="5400000">
-            <a:off x="5293184" y="995647"/>
-            <a:ext cx="687196" cy="918438"/>
+            <a:off x="5290803" y="993265"/>
+            <a:ext cx="691959" cy="918438"/>
           </a:xfrm>
           <a:prstGeom prst="bentConnector3">
-            <a:avLst/>
+            <a:avLst>
+              <a:gd name="adj1" fmla="val 50000"/>
+            </a:avLst>
           </a:prstGeom>
           <a:ln w="38100">
             <a:solidFill>
@@ -5918,7 +5657,7 @@
         <p:spPr>
           <a:xfrm flipV="1">
             <a:off x="6009682" y="2074420"/>
-            <a:ext cx="120260" cy="231876"/>
+            <a:ext cx="123794" cy="231876"/>
           </a:xfrm>
           <a:prstGeom prst="line">
             <a:avLst/>
@@ -5959,9 +5698,9 @@
         <p:grpSpPr>
           <a:xfrm>
             <a:off x="1121944" y="1106505"/>
-            <a:ext cx="4974057" cy="1250976"/>
-            <a:chOff x="1121944" y="1106505"/>
-            <a:chExt cx="4974057" cy="1250976"/>
+            <a:ext cx="4974057" cy="1260424"/>
+            <a:chOff x="1121944" y="1068405"/>
+            <a:chExt cx="4974057" cy="1260424"/>
           </a:xfrm>
         </p:grpSpPr>
         <p:cxnSp>
@@ -5982,11 +5721,13 @@
           </p:nvCxnSpPr>
           <p:spPr>
             <a:xfrm rot="5400000">
-              <a:off x="3697783" y="-594735"/>
-              <a:ext cx="696978" cy="4099458"/>
+              <a:off x="3846947" y="-781999"/>
+              <a:ext cx="398650" cy="4099458"/>
             </a:xfrm>
             <a:prstGeom prst="bentConnector3">
-              <a:avLst/>
+              <a:avLst>
+                <a:gd name="adj1" fmla="val 50000"/>
+              </a:avLst>
             </a:prstGeom>
             <a:ln w="38100">
               <a:solidFill>
@@ -6025,8 +5766,8 @@
           </p:nvSpPr>
           <p:spPr>
             <a:xfrm>
-              <a:off x="1121944" y="1803483"/>
-              <a:ext cx="1749197" cy="553998"/>
+              <a:off x="1121944" y="1467055"/>
+              <a:ext cx="1749197" cy="861774"/>
             </a:xfrm>
             <a:prstGeom prst="rect">
               <a:avLst/>
@@ -6091,7 +5832,23 @@
                     <a:schemeClr val="tx1"/>
                   </a:solidFill>
                 </a:rPr>
-                <a:t>- Staff dashboard</a:t>
+                <a:t>- Staff dashboard (entity lookup, account management, continuation in reviews, </a:t>
+              </a:r>
+              <a:r>
+                <a:rPr lang="en-US" sz="1000" i="1" dirty="0" err="1">
+                  <a:solidFill>
+                    <a:schemeClr val="tx1"/>
+                  </a:solidFill>
+                </a:rPr>
+                <a:t>etc</a:t>
+              </a:r>
+              <a:r>
+                <a:rPr lang="en-US" sz="1000" i="1" dirty="0">
+                  <a:solidFill>
+                    <a:schemeClr val="tx1"/>
+                  </a:solidFill>
+                </a:rPr>
+                <a:t>)</a:t>
               </a:r>
             </a:p>
           </p:txBody>
@@ -6127,7 +5884,7 @@
           </p:blipFill>
           <p:spPr>
             <a:xfrm>
-              <a:off x="3002608" y="1801321"/>
+              <a:off x="3002608" y="1465095"/>
               <a:ext cx="551911" cy="551911"/>
             </a:xfrm>
             <a:prstGeom prst="rect">
@@ -6153,8 +5910,8 @@
           </p:nvCxnSpPr>
           <p:spPr>
             <a:xfrm flipV="1">
-              <a:off x="2871141" y="2077277"/>
-              <a:ext cx="131467" cy="3205"/>
+              <a:off x="2871141" y="1741051"/>
+              <a:ext cx="131467" cy="156891"/>
             </a:xfrm>
             <a:prstGeom prst="line">
               <a:avLst/>
@@ -6363,12 +6120,12 @@
           </p:nvCxnSpPr>
           <p:spPr>
             <a:xfrm flipV="1">
-              <a:off x="5135459" y="3730069"/>
-              <a:ext cx="1051922" cy="1274677"/>
+              <a:off x="5135459" y="3722032"/>
+              <a:ext cx="1051922" cy="1282714"/>
             </a:xfrm>
             <a:prstGeom prst="bentConnector3">
               <a:avLst>
-                <a:gd name="adj1" fmla="val 50000"/>
+                <a:gd name="adj1" fmla="val 49321"/>
               </a:avLst>
             </a:prstGeom>
             <a:ln w="38100">
@@ -6409,8 +6166,8 @@
         </p:nvSpPr>
         <p:spPr>
           <a:xfrm>
-            <a:off x="4525701" y="6311876"/>
-            <a:ext cx="3140603" cy="246221"/>
+            <a:off x="3455704" y="6311876"/>
+            <a:ext cx="5280612" cy="246221"/>
           </a:xfrm>
           <a:prstGeom prst="rect">
             <a:avLst/>
@@ -6429,7 +6186,7 @@
             <a:pPr algn="ctr"/>
             <a:r>
               <a:rPr lang="en-US" sz="1000" dirty="0"/>
-              <a:t>(Some user flows and API-API calls are left out for clarity.)</a:t>
+              <a:t>(The intent is to generally show how components interact, not to show all flows and API-API calls.)</a:t>
             </a:r>
           </a:p>
         </p:txBody>
@@ -6448,10 +6205,10 @@
         </p:nvGrpSpPr>
         <p:grpSpPr>
           <a:xfrm>
-            <a:off x="8512939" y="3448309"/>
-            <a:ext cx="1626722" cy="553998"/>
-            <a:chOff x="8512939" y="3448309"/>
-            <a:chExt cx="1626722" cy="553998"/>
+            <a:off x="8591874" y="3712020"/>
+            <a:ext cx="1622728" cy="557592"/>
+            <a:chOff x="8626543" y="3826095"/>
+            <a:chExt cx="1622728" cy="557592"/>
           </a:xfrm>
         </p:grpSpPr>
         <p:sp>
@@ -6468,8 +6225,8 @@
           </p:nvSpPr>
           <p:spPr>
             <a:xfrm>
-              <a:off x="8512939" y="3448309"/>
-              <a:ext cx="947695" cy="553998"/>
+              <a:off x="8626543" y="3829689"/>
+              <a:ext cx="915635" cy="553998"/>
             </a:xfrm>
             <a:prstGeom prst="rect">
               <a:avLst/>
@@ -6516,7 +6273,7 @@
                     <a:schemeClr val="tx1"/>
                   </a:solidFill>
                 </a:rPr>
-                <a:t>- Legacy corps,</a:t>
+                <a:t>Corporations,</a:t>
               </a:r>
             </a:p>
             <a:p>
@@ -6575,7 +6332,7 @@
           </p:blipFill>
           <p:spPr>
             <a:xfrm>
-              <a:off x="9587750" y="3448309"/>
+              <a:off x="9697360" y="3826095"/>
               <a:ext cx="551911" cy="551911"/>
             </a:xfrm>
             <a:prstGeom prst="rect">
@@ -6601,8 +6358,8 @@
           </p:nvCxnSpPr>
           <p:spPr>
             <a:xfrm flipV="1">
-              <a:off x="9460634" y="3724265"/>
-              <a:ext cx="127116" cy="1043"/>
+              <a:off x="9542178" y="4102051"/>
+              <a:ext cx="155182" cy="4637"/>
             </a:xfrm>
             <a:prstGeom prst="line">
               <a:avLst/>
@@ -6629,53 +6386,6 @@
           </p:style>
         </p:cxnSp>
       </p:grpSp>
-      <p:cxnSp>
-        <p:nvCxnSpPr>
-          <p:cNvPr id="493" name="Connector: Elbow 492">
-            <a:extLst>
-              <a:ext uri="{FF2B5EF4-FFF2-40B4-BE49-F238E27FC236}">
-                <a16:creationId xmlns:a16="http://schemas.microsoft.com/office/drawing/2014/main" id="{DD645313-FC58-2299-CA55-169A2AB861FD}"/>
-              </a:ext>
-            </a:extLst>
-          </p:cNvPr>
-          <p:cNvCxnSpPr>
-            <a:stCxn id="33" idx="0"/>
-            <a:endCxn id="489" idx="0"/>
-          </p:cNvCxnSpPr>
-          <p:nvPr/>
-        </p:nvCxnSpPr>
-        <p:spPr>
-          <a:xfrm rot="5400000" flipH="1" flipV="1">
-            <a:off x="7853688" y="2319971"/>
-            <a:ext cx="4761" cy="2261438"/>
-          </a:xfrm>
-          <a:prstGeom prst="bentConnector3">
-            <a:avLst>
-              <a:gd name="adj1" fmla="val 4901512"/>
-            </a:avLst>
-          </a:prstGeom>
-          <a:ln w="38100">
-            <a:solidFill>
-              <a:schemeClr val="accent2"/>
-            </a:solidFill>
-            <a:tailEnd type="triangle"/>
-          </a:ln>
-        </p:spPr>
-        <p:style>
-          <a:lnRef idx="1">
-            <a:schemeClr val="accent1"/>
-          </a:lnRef>
-          <a:fillRef idx="0">
-            <a:schemeClr val="accent1"/>
-          </a:fillRef>
-          <a:effectRef idx="0">
-            <a:schemeClr val="accent1"/>
-          </a:effectRef>
-          <a:fontRef idx="minor">
-            <a:schemeClr val="tx1"/>
-          </a:fontRef>
-        </p:style>
-      </p:cxnSp>
       <p:cxnSp>
         <p:nvCxnSpPr>
           <p:cNvPr id="538" name="Connector: Elbow 537">
@@ -7012,8 +6722,8 @@
         </p:nvCxnSpPr>
         <p:spPr>
           <a:xfrm rot="16200000" flipH="1">
-            <a:off x="6708394" y="4024022"/>
-            <a:ext cx="757575" cy="723665"/>
+            <a:off x="6788533" y="4104162"/>
+            <a:ext cx="611724" cy="709238"/>
           </a:xfrm>
           <a:prstGeom prst="bentConnector2">
             <a:avLst/>
@@ -7152,13 +6862,13 @@
         </p:nvCxnSpPr>
         <p:spPr>
           <a:xfrm rot="10800000" flipH="1" flipV="1">
-            <a:off x="1121943" y="2080481"/>
-            <a:ext cx="6680693" cy="2807271"/>
+            <a:off x="1121943" y="1936041"/>
+            <a:ext cx="6680693" cy="2951711"/>
           </a:xfrm>
           <a:prstGeom prst="bentConnector4">
             <a:avLst>
               <a:gd name="adj1" fmla="val -3422"/>
-              <a:gd name="adj2" fmla="val 138585"/>
+              <a:gd name="adj2" fmla="val 137433"/>
             </a:avLst>
           </a:prstGeom>
           <a:ln w="38100">
@@ -7405,17 +7115,155 @@
         </p:nvCxnSpPr>
         <p:spPr>
           <a:xfrm>
-            <a:off x="4992888" y="3862426"/>
-            <a:ext cx="2456126" cy="902217"/>
+            <a:off x="5002788" y="3850969"/>
+            <a:ext cx="2446226" cy="913674"/>
           </a:xfrm>
           <a:prstGeom prst="bentConnector3">
             <a:avLst>
-              <a:gd name="adj1" fmla="val 40171"/>
+              <a:gd name="adj1" fmla="val 39974"/>
             </a:avLst>
           </a:prstGeom>
           <a:ln w="38100">
             <a:solidFill>
               <a:schemeClr val="accent6"/>
+            </a:solidFill>
+            <a:tailEnd type="triangle"/>
+          </a:ln>
+        </p:spPr>
+        <p:style>
+          <a:lnRef idx="1">
+            <a:schemeClr val="accent1"/>
+          </a:lnRef>
+          <a:fillRef idx="0">
+            <a:schemeClr val="accent1"/>
+          </a:fillRef>
+          <a:effectRef idx="0">
+            <a:schemeClr val="accent1"/>
+          </a:effectRef>
+          <a:fontRef idx="minor">
+            <a:schemeClr val="tx1"/>
+          </a:fontRef>
+        </p:style>
+      </p:cxnSp>
+      <p:cxnSp>
+        <p:nvCxnSpPr>
+          <p:cNvPr id="31" name="Connector: Elbow 30">
+            <a:extLst>
+              <a:ext uri="{FF2B5EF4-FFF2-40B4-BE49-F238E27FC236}">
+                <a16:creationId xmlns:a16="http://schemas.microsoft.com/office/drawing/2014/main" id="{34DE2AED-22DF-33ED-C5F6-0D2F49337592}"/>
+              </a:ext>
+            </a:extLst>
+          </p:cNvPr>
+          <p:cNvCxnSpPr>
+            <a:cxnSpLocks/>
+            <a:stCxn id="35" idx="2"/>
+          </p:cNvCxnSpPr>
+          <p:nvPr/>
+        </p:nvCxnSpPr>
+        <p:spPr>
+          <a:xfrm rot="5400000">
+            <a:off x="6909423" y="2318642"/>
+            <a:ext cx="1087794" cy="847139"/>
+          </a:xfrm>
+          <a:prstGeom prst="bentConnector3">
+            <a:avLst>
+              <a:gd name="adj1" fmla="val 46497"/>
+            </a:avLst>
+          </a:prstGeom>
+          <a:ln w="38100">
+            <a:solidFill>
+              <a:schemeClr val="accent2"/>
+            </a:solidFill>
+            <a:tailEnd type="triangle"/>
+          </a:ln>
+        </p:spPr>
+        <p:style>
+          <a:lnRef idx="1">
+            <a:schemeClr val="accent1"/>
+          </a:lnRef>
+          <a:fillRef idx="0">
+            <a:schemeClr val="accent1"/>
+          </a:fillRef>
+          <a:effectRef idx="0">
+            <a:schemeClr val="accent1"/>
+          </a:effectRef>
+          <a:fontRef idx="minor">
+            <a:schemeClr val="tx1"/>
+          </a:fontRef>
+        </p:style>
+      </p:cxnSp>
+      <p:cxnSp>
+        <p:nvCxnSpPr>
+          <p:cNvPr id="3" name="Connector: Elbow 2">
+            <a:extLst>
+              <a:ext uri="{FF2B5EF4-FFF2-40B4-BE49-F238E27FC236}">
+                <a16:creationId xmlns:a16="http://schemas.microsoft.com/office/drawing/2014/main" id="{6C8C10C3-D0EC-6E99-C565-E230D1C038BF}"/>
+              </a:ext>
+            </a:extLst>
+          </p:cNvPr>
+          <p:cNvCxnSpPr>
+            <a:cxnSpLocks/>
+            <a:endCxn id="33" idx="0"/>
+          </p:cNvCxnSpPr>
+          <p:nvPr/>
+        </p:nvCxnSpPr>
+        <p:spPr>
+          <a:xfrm>
+            <a:off x="6009684" y="2704057"/>
+            <a:ext cx="730092" cy="587088"/>
+          </a:xfrm>
+          <a:prstGeom prst="bentConnector2">
+            <a:avLst/>
+          </a:prstGeom>
+          <a:ln w="38100">
+            <a:solidFill>
+              <a:schemeClr val="accent2"/>
+            </a:solidFill>
+            <a:headEnd type="triangle"/>
+            <a:tailEnd type="triangle"/>
+          </a:ln>
+        </p:spPr>
+        <p:style>
+          <a:lnRef idx="1">
+            <a:schemeClr val="accent1"/>
+          </a:lnRef>
+          <a:fillRef idx="0">
+            <a:schemeClr val="accent1"/>
+          </a:fillRef>
+          <a:effectRef idx="0">
+            <a:schemeClr val="accent1"/>
+          </a:effectRef>
+          <a:fontRef idx="minor">
+            <a:schemeClr val="tx1"/>
+          </a:fontRef>
+        </p:style>
+      </p:cxnSp>
+      <p:cxnSp>
+        <p:nvCxnSpPr>
+          <p:cNvPr id="42" name="Straight Connector 41">
+            <a:extLst>
+              <a:ext uri="{FF2B5EF4-FFF2-40B4-BE49-F238E27FC236}">
+                <a16:creationId xmlns:a16="http://schemas.microsoft.com/office/drawing/2014/main" id="{8E825D62-0732-798C-EC1A-67BFB0592B24}"/>
+              </a:ext>
+            </a:extLst>
+          </p:cNvPr>
+          <p:cNvCxnSpPr>
+            <a:cxnSpLocks/>
+            <a:endCxn id="489" idx="1"/>
+          </p:cNvCxnSpPr>
+          <p:nvPr/>
+        </p:nvCxnSpPr>
+        <p:spPr>
+          <a:xfrm flipV="1">
+            <a:off x="7284291" y="3992613"/>
+            <a:ext cx="1307583" cy="17747"/>
+          </a:xfrm>
+          <a:prstGeom prst="line">
+            <a:avLst/>
+          </a:prstGeom>
+          <a:ln w="38100">
+            <a:solidFill>
+              <a:schemeClr val="accent2"/>
             </a:solidFill>
             <a:tailEnd type="triangle"/>
           </a:ln>

</xml_diff>

<commit_message>
- added accounts diagram
</commit_message>
<xml_diff>
--- a/docs/diagrams/source/app hierarchy.pptx
+++ b/docs/diagrams/source/app hierarchy.pptx
@@ -3890,10 +3890,10 @@
         </p:nvGrpSpPr>
         <p:grpSpPr>
           <a:xfrm>
-            <a:off x="6187381" y="3291145"/>
-            <a:ext cx="1781159" cy="861774"/>
+            <a:off x="6187381" y="3214945"/>
+            <a:ext cx="1781159" cy="1015663"/>
             <a:chOff x="6187381" y="3291145"/>
-            <a:chExt cx="1781159" cy="861774"/>
+            <a:chExt cx="1781159" cy="1015663"/>
           </a:xfrm>
         </p:grpSpPr>
         <p:sp>
@@ -3911,7 +3911,7 @@
           <p:spPr>
             <a:xfrm>
               <a:off x="6187381" y="3291145"/>
-              <a:ext cx="1104790" cy="861774"/>
+              <a:ext cx="1104790" cy="1015663"/>
             </a:xfrm>
             <a:prstGeom prst="rect">
               <a:avLst/>
@@ -3949,6 +3949,16 @@
                   </a:solidFill>
                 </a:rPr>
                 <a:t>Business Registry</a:t>
+              </a:r>
+            </a:p>
+            <a:p>
+              <a:r>
+                <a:rPr lang="en-US" sz="1000" b="1" dirty="0">
+                  <a:solidFill>
+                    <a:schemeClr val="tx1"/>
+                  </a:solidFill>
+                </a:rPr>
+                <a:t>Services</a:t>
               </a:r>
             </a:p>
             <a:p>
@@ -4056,7 +4066,7 @@
           <p:spPr>
             <a:xfrm flipV="1">
               <a:off x="7292171" y="3567101"/>
-              <a:ext cx="124458" cy="154931"/>
+              <a:ext cx="124458" cy="231876"/>
             </a:xfrm>
             <a:prstGeom prst="line">
               <a:avLst/>
@@ -4409,8 +4419,8 @@
           </p:nvCxnSpPr>
           <p:spPr>
             <a:xfrm flipV="1">
-              <a:off x="4992888" y="3722032"/>
-              <a:ext cx="1194493" cy="3276"/>
+              <a:off x="4992888" y="3722777"/>
+              <a:ext cx="1194493" cy="2531"/>
             </a:xfrm>
             <a:prstGeom prst="straightConnector1">
               <a:avLst/>
@@ -4592,8 +4602,8 @@
           </p:nvCxnSpPr>
           <p:spPr>
             <a:xfrm flipV="1">
-              <a:off x="4584027" y="3722032"/>
-              <a:ext cx="1603354" cy="1846687"/>
+              <a:off x="4584027" y="3722777"/>
+              <a:ext cx="1603354" cy="1845942"/>
             </a:xfrm>
             <a:prstGeom prst="bentConnector3">
               <a:avLst>
@@ -4814,12 +4824,12 @@
           </p:nvCxnSpPr>
           <p:spPr>
             <a:xfrm flipV="1">
-              <a:off x="5217229" y="3722032"/>
-              <a:ext cx="970152" cy="641462"/>
+              <a:off x="5217229" y="3722777"/>
+              <a:ext cx="970152" cy="640717"/>
             </a:xfrm>
             <a:prstGeom prst="bentConnector3">
               <a:avLst>
-                <a:gd name="adj1" fmla="val 45091"/>
+                <a:gd name="adj1" fmla="val 45582"/>
               </a:avLst>
             </a:prstGeom>
             <a:ln w="38100">
@@ -6120,12 +6130,12 @@
           </p:nvCxnSpPr>
           <p:spPr>
             <a:xfrm flipV="1">
-              <a:off x="5135459" y="3722032"/>
-              <a:ext cx="1051922" cy="1282714"/>
+              <a:off x="5135459" y="3722777"/>
+              <a:ext cx="1051922" cy="1281969"/>
             </a:xfrm>
             <a:prstGeom prst="bentConnector3">
               <a:avLst>
-                <a:gd name="adj1" fmla="val 49321"/>
+                <a:gd name="adj1" fmla="val 50000"/>
               </a:avLst>
             </a:prstGeom>
             <a:ln w="38100">
@@ -6722,8 +6732,8 @@
         </p:nvCxnSpPr>
         <p:spPr>
           <a:xfrm rot="16200000" flipH="1">
-            <a:off x="6788533" y="4104162"/>
-            <a:ext cx="611724" cy="709238"/>
+            <a:off x="6827378" y="4143006"/>
+            <a:ext cx="534035" cy="709238"/>
           </a:xfrm>
           <a:prstGeom prst="bentConnector2">
             <a:avLst/>
@@ -7162,12 +7172,12 @@
         </p:nvCxnSpPr>
         <p:spPr>
           <a:xfrm rot="5400000">
-            <a:off x="6909423" y="2318642"/>
-            <a:ext cx="1087794" cy="847139"/>
+            <a:off x="6954379" y="2292436"/>
+            <a:ext cx="1016633" cy="828389"/>
           </a:xfrm>
           <a:prstGeom prst="bentConnector3">
             <a:avLst>
-              <a:gd name="adj1" fmla="val 46497"/>
+              <a:gd name="adj1" fmla="val 50000"/>
             </a:avLst>
           </a:prstGeom>
           <a:ln w="38100">
@@ -7209,7 +7219,7 @@
         </p:nvCxnSpPr>
         <p:spPr>
           <a:xfrm>
-            <a:off x="6009684" y="2704057"/>
+            <a:off x="6009684" y="2627857"/>
             <a:ext cx="730092" cy="587088"/>
           </a:xfrm>
           <a:prstGeom prst="bentConnector2">

</xml_diff>